<commit_message>
Implemented some of the Redpin connection logic.
</commit_message>
<xml_diff>
--- a/Documentation/Group27FinalPresentation.pptx
+++ b/Documentation/Group27FinalPresentation.pptx
@@ -10,12 +10,18 @@
     <p:sldId id="258" r:id="rId4"/>
     <p:sldId id="259" r:id="rId5"/>
     <p:sldId id="263" r:id="rId6"/>
-    <p:sldId id="264" r:id="rId7"/>
-    <p:sldId id="265" r:id="rId8"/>
-    <p:sldId id="266" r:id="rId9"/>
-    <p:sldId id="260" r:id="rId10"/>
-    <p:sldId id="261" r:id="rId11"/>
-    <p:sldId id="262" r:id="rId12"/>
+    <p:sldId id="268" r:id="rId7"/>
+    <p:sldId id="264" r:id="rId8"/>
+    <p:sldId id="269" r:id="rId9"/>
+    <p:sldId id="265" r:id="rId10"/>
+    <p:sldId id="267" r:id="rId11"/>
+    <p:sldId id="266" r:id="rId12"/>
+    <p:sldId id="270" r:id="rId13"/>
+    <p:sldId id="260" r:id="rId14"/>
+    <p:sldId id="261" r:id="rId15"/>
+    <p:sldId id="271" r:id="rId16"/>
+    <p:sldId id="272" r:id="rId17"/>
+    <p:sldId id="262" r:id="rId18"/>
   </p:sldIdLst>
   <p:sldSz cx="12192000" cy="6858000"/>
   <p:notesSz cx="6858000" cy="9144000"/>
@@ -114,6 +120,11 @@
       </a:defRPr>
     </a:lvl9pPr>
   </p:defaultTextStyle>
+  <p:extLst>
+    <p:ext uri="{EFAFB233-063F-42B5-8137-9DF3F51BA10A}">
+      <p15:sldGuideLst xmlns:p15="http://schemas.microsoft.com/office/powerpoint/2012/main"/>
+    </p:ext>
+  </p:extLst>
 </p:presentation>
 </file>
 
@@ -840,7 +851,7 @@
             <a:fld id="{B61BEF0D-F0BB-DE4B-95CE-6DB70DBA9567}" type="datetimeFigureOut">
               <a:rPr lang="en-US" dirty="0"/>
               <a:pPr/>
-              <a:t>4/20/2019</a:t>
+              <a:t>4/28/2019</a:t>
             </a:fld>
             <a:endParaRPr lang="en-US" dirty="0"/>
           </a:p>
@@ -1088,7 +1099,7 @@
             <a:fld id="{B61BEF0D-F0BB-DE4B-95CE-6DB70DBA9567}" type="datetimeFigureOut">
               <a:rPr lang="en-US" dirty="0"/>
               <a:pPr/>
-              <a:t>4/20/2019</a:t>
+              <a:t>4/28/2019</a:t>
             </a:fld>
             <a:endParaRPr lang="en-US" dirty="0"/>
           </a:p>
@@ -1399,7 +1410,7 @@
             <a:fld id="{B61BEF0D-F0BB-DE4B-95CE-6DB70DBA9567}" type="datetimeFigureOut">
               <a:rPr lang="en-US" dirty="0"/>
               <a:pPr/>
-              <a:t>4/20/2019</a:t>
+              <a:t>4/28/2019</a:t>
             </a:fld>
             <a:endParaRPr lang="en-US" dirty="0"/>
           </a:p>
@@ -1737,7 +1748,7 @@
             <a:fld id="{B61BEF0D-F0BB-DE4B-95CE-6DB70DBA9567}" type="datetimeFigureOut">
               <a:rPr lang="en-US" dirty="0"/>
               <a:pPr/>
-              <a:t>4/20/2019</a:t>
+              <a:t>4/28/2019</a:t>
             </a:fld>
             <a:endParaRPr lang="en-US" dirty="0"/>
           </a:p>
@@ -2048,7 +2059,7 @@
             <a:fld id="{B61BEF0D-F0BB-DE4B-95CE-6DB70DBA9567}" type="datetimeFigureOut">
               <a:rPr lang="en-US" dirty="0"/>
               <a:pPr/>
-              <a:t>4/20/2019</a:t>
+              <a:t>4/28/2019</a:t>
             </a:fld>
             <a:endParaRPr lang="en-US" dirty="0"/>
           </a:p>
@@ -2438,7 +2449,7 @@
             <a:fld id="{B61BEF0D-F0BB-DE4B-95CE-6DB70DBA9567}" type="datetimeFigureOut">
               <a:rPr lang="en-US" dirty="0"/>
               <a:pPr/>
-              <a:t>4/20/2019</a:t>
+              <a:t>4/28/2019</a:t>
             </a:fld>
             <a:endParaRPr lang="en-US" dirty="0"/>
           </a:p>
@@ -2604,7 +2615,7 @@
           <a:p>
             <a:fld id="{55C6B4A9-1611-4792-9094-5F34BCA07E0B}" type="datetimeFigureOut">
               <a:rPr lang="en-US" dirty="0"/>
-              <a:t>4/20/2019</a:t>
+              <a:t>4/28/2019</a:t>
             </a:fld>
             <a:endParaRPr lang="en-US" dirty="0"/>
           </a:p>
@@ -2780,7 +2791,7 @@
             <a:fld id="{B61BEF0D-F0BB-DE4B-95CE-6DB70DBA9567}" type="datetimeFigureOut">
               <a:rPr lang="en-US" dirty="0"/>
               <a:pPr/>
-              <a:t>4/20/2019</a:t>
+              <a:t>4/28/2019</a:t>
             </a:fld>
             <a:endParaRPr lang="en-US" dirty="0"/>
           </a:p>
@@ -2953,7 +2964,7 @@
             <a:fld id="{B61BEF0D-F0BB-DE4B-95CE-6DB70DBA9567}" type="datetimeFigureOut">
               <a:rPr lang="en-US" dirty="0"/>
               <a:pPr/>
-              <a:t>4/20/2019</a:t>
+              <a:t>4/28/2019</a:t>
             </a:fld>
             <a:endParaRPr lang="en-US" dirty="0"/>
           </a:p>
@@ -3197,7 +3208,7 @@
             <a:fld id="{B61BEF0D-F0BB-DE4B-95CE-6DB70DBA9567}" type="datetimeFigureOut">
               <a:rPr lang="en-US" dirty="0"/>
               <a:pPr/>
-              <a:t>4/20/2019</a:t>
+              <a:t>4/28/2019</a:t>
             </a:fld>
             <a:endParaRPr lang="en-US" dirty="0"/>
           </a:p>
@@ -3425,7 +3436,7 @@
           <a:p>
             <a:fld id="{EB712588-04B1-427B-82EE-E8DB90309F08}" type="datetimeFigureOut">
               <a:rPr lang="en-US" dirty="0"/>
-              <a:t>4/20/2019</a:t>
+              <a:t>4/28/2019</a:t>
             </a:fld>
             <a:endParaRPr lang="en-US" dirty="0"/>
           </a:p>
@@ -3795,7 +3806,7 @@
             <a:fld id="{B61BEF0D-F0BB-DE4B-95CE-6DB70DBA9567}" type="datetimeFigureOut">
               <a:rPr lang="en-US" dirty="0"/>
               <a:pPr/>
-              <a:t>4/20/2019</a:t>
+              <a:t>4/28/2019</a:t>
             </a:fld>
             <a:endParaRPr lang="en-US" dirty="0"/>
           </a:p>
@@ -3915,7 +3926,7 @@
             <a:fld id="{B61BEF0D-F0BB-DE4B-95CE-6DB70DBA9567}" type="datetimeFigureOut">
               <a:rPr lang="en-US" dirty="0"/>
               <a:pPr/>
-              <a:t>4/20/2019</a:t>
+              <a:t>4/28/2019</a:t>
             </a:fld>
             <a:endParaRPr lang="en-US" dirty="0"/>
           </a:p>
@@ -4007,7 +4018,7 @@
             <a:fld id="{B61BEF0D-F0BB-DE4B-95CE-6DB70DBA9567}" type="datetimeFigureOut">
               <a:rPr lang="en-US" dirty="0"/>
               <a:pPr/>
-              <a:t>4/20/2019</a:t>
+              <a:t>4/28/2019</a:t>
             </a:fld>
             <a:endParaRPr lang="en-US" dirty="0"/>
           </a:p>
@@ -4258,7 +4269,7 @@
           <a:p>
             <a:fld id="{42A54C80-263E-416B-A8E0-580EDEADCBDC}" type="datetimeFigureOut">
               <a:rPr lang="en-US" dirty="0"/>
-              <a:t>4/20/2019</a:t>
+              <a:t>4/28/2019</a:t>
             </a:fld>
             <a:endParaRPr lang="en-US" dirty="0"/>
           </a:p>
@@ -4517,7 +4528,7 @@
             <a:fld id="{B61BEF0D-F0BB-DE4B-95CE-6DB70DBA9567}" type="datetimeFigureOut">
               <a:rPr lang="en-US" dirty="0"/>
               <a:pPr/>
-              <a:t>4/20/2019</a:t>
+              <a:t>4/28/2019</a:t>
             </a:fld>
             <a:endParaRPr lang="en-US" dirty="0"/>
           </a:p>
@@ -5257,7 +5268,7 @@
             <a:fld id="{B61BEF0D-F0BB-DE4B-95CE-6DB70DBA9567}" type="datetimeFigureOut">
               <a:rPr lang="en-US" dirty="0"/>
               <a:pPr/>
-              <a:t>4/20/2019</a:t>
+              <a:t>4/28/2019</a:t>
             </a:fld>
             <a:endParaRPr lang="en-US" dirty="0"/>
           </a:p>
@@ -5893,7 +5904,7 @@
           <p:cNvPr id="2" name="Title 1">
             <a:extLst>
               <a:ext uri="{FF2B5EF4-FFF2-40B4-BE49-F238E27FC236}">
-                <a16:creationId xmlns:a16="http://schemas.microsoft.com/office/drawing/2014/main" id="{EB6B9FB1-D0AE-4BAC-800F-442A41EC7908}"/>
+                <a16:creationId xmlns:a16="http://schemas.microsoft.com/office/drawing/2014/main" id="{DE5B46A4-EF06-47F5-98FC-6D6AC825C487}"/>
               </a:ext>
             </a:extLst>
           </p:cNvPr>
@@ -5911,7 +5922,7 @@
           <a:p>
             <a:r>
               <a:rPr lang="en-US" dirty="0"/>
-              <a:t>Summary of Results</a:t>
+              <a:t>Design Risks - Aljagthmi</a:t>
             </a:r>
           </a:p>
         </p:txBody>
@@ -5921,7 +5932,7 @@
           <p:cNvPr id="3" name="Content Placeholder 2">
             <a:extLst>
               <a:ext uri="{FF2B5EF4-FFF2-40B4-BE49-F238E27FC236}">
-                <a16:creationId xmlns:a16="http://schemas.microsoft.com/office/drawing/2014/main" id="{69417E1A-3C29-493C-8931-77F9F42D5D33}"/>
+                <a16:creationId xmlns:a16="http://schemas.microsoft.com/office/drawing/2014/main" id="{EB167F55-844A-44A4-A555-AFD065872D5F}"/>
               </a:ext>
             </a:extLst>
           </p:cNvPr>
@@ -5937,14 +5948,38 @@
           <a:bodyPr/>
           <a:lstStyle/>
           <a:p>
-            <a:endParaRPr lang="en-US"/>
+            <a:r>
+              <a:rPr lang="en-US" dirty="0">
+                <a:solidFill>
+                  <a:schemeClr val="tx1"/>
+                </a:solidFill>
+              </a:rPr>
+              <a:t>Development </a:t>
+            </a:r>
+          </a:p>
+          <a:p>
+            <a:r>
+              <a:rPr lang="en-US" dirty="0">
+                <a:solidFill>
+                  <a:schemeClr val="tx1"/>
+                </a:solidFill>
+              </a:rPr>
+              <a:t>Creation of the mobile application might take longer than anticipated </a:t>
+            </a:r>
+          </a:p>
+          <a:p>
+            <a:endParaRPr lang="en-US" dirty="0">
+              <a:solidFill>
+                <a:schemeClr val="tx1"/>
+              </a:solidFill>
+            </a:endParaRPr>
           </a:p>
         </p:txBody>
       </p:sp>
     </p:spTree>
     <p:extLst>
       <p:ext uri="{BB962C8B-B14F-4D97-AF65-F5344CB8AC3E}">
-        <p14:creationId xmlns:p14="http://schemas.microsoft.com/office/powerpoint/2010/main" val="916257301"/>
+        <p14:creationId xmlns:p14="http://schemas.microsoft.com/office/powerpoint/2010/main" val="425613201"/>
       </p:ext>
     </p:extLst>
   </p:cSld>
@@ -5976,6 +6011,641 @@
           <p:cNvPr id="2" name="Title 1">
             <a:extLst>
               <a:ext uri="{FF2B5EF4-FFF2-40B4-BE49-F238E27FC236}">
+                <a16:creationId xmlns:a16="http://schemas.microsoft.com/office/drawing/2014/main" id="{D4AA106D-6998-44BC-BD6A-37D6EDB62754}"/>
+              </a:ext>
+            </a:extLst>
+          </p:cNvPr>
+          <p:cNvSpPr>
+            <a:spLocks noGrp="1"/>
+          </p:cNvSpPr>
+          <p:nvPr>
+            <p:ph type="title"/>
+          </p:nvPr>
+        </p:nvSpPr>
+        <p:spPr/>
+        <p:txBody>
+          <a:bodyPr/>
+          <a:lstStyle/>
+          <a:p>
+            <a:r>
+              <a:rPr lang="en-US" dirty="0"/>
+              <a:t>Design Approach - Manser</a:t>
+            </a:r>
+          </a:p>
+        </p:txBody>
+      </p:sp>
+      <p:sp>
+        <p:nvSpPr>
+          <p:cNvPr id="3" name="Content Placeholder 2">
+            <a:extLst>
+              <a:ext uri="{FF2B5EF4-FFF2-40B4-BE49-F238E27FC236}">
+                <a16:creationId xmlns:a16="http://schemas.microsoft.com/office/drawing/2014/main" id="{61DC3010-D79E-4888-BEA9-4A4F267442AF}"/>
+              </a:ext>
+            </a:extLst>
+          </p:cNvPr>
+          <p:cNvSpPr>
+            <a:spLocks noGrp="1"/>
+          </p:cNvSpPr>
+          <p:nvPr>
+            <p:ph idx="1"/>
+          </p:nvPr>
+        </p:nvSpPr>
+        <p:spPr/>
+        <p:txBody>
+          <a:bodyPr/>
+          <a:lstStyle/>
+          <a:p>
+            <a:r>
+              <a:rPr lang="en-US" dirty="0"/>
+              <a:t>Hold down the GPIO0 and Reset Button for around five seconds to set the Adafruit Huzzah to programmable mode</a:t>
+            </a:r>
+          </a:p>
+          <a:p>
+            <a:r>
+              <a:rPr lang="en-US" dirty="0"/>
+              <a:t>Start Arduino IDE and open up the Preference window to add the URL </a:t>
+            </a:r>
+            <a:r>
+              <a:rPr lang="en-US" dirty="0">
+                <a:hlinkClick r:id="rId2"/>
+              </a:rPr>
+              <a:t>http://arduino.esp8266.com/stable/package_esp8266com_index.json</a:t>
+            </a:r>
+            <a:r>
+              <a:rPr lang="en-US" dirty="0"/>
+              <a:t> in the </a:t>
+            </a:r>
+            <a:r>
+              <a:rPr lang="en-US" i="1" dirty="0"/>
+              <a:t>Additional Board Manager </a:t>
+            </a:r>
+            <a:r>
+              <a:rPr lang="en-US" dirty="0"/>
+              <a:t>section in order to select the correct board manager (Adafruit HUZZAH 8266)</a:t>
+            </a:r>
+          </a:p>
+          <a:p>
+            <a:r>
+              <a:rPr lang="en-US" dirty="0"/>
+              <a:t>Program to see if it was possible to make the LED light blink</a:t>
+            </a:r>
+          </a:p>
+          <a:p>
+            <a:r>
+              <a:rPr lang="en-US" dirty="0"/>
+              <a:t>Program to see if the chip was able to establish a Wi-Fi connection with the local Internet</a:t>
+            </a:r>
+          </a:p>
+        </p:txBody>
+      </p:sp>
+    </p:spTree>
+    <p:extLst>
+      <p:ext uri="{BB962C8B-B14F-4D97-AF65-F5344CB8AC3E}">
+        <p14:creationId xmlns:p14="http://schemas.microsoft.com/office/powerpoint/2010/main" val="3562799535"/>
+      </p:ext>
+    </p:extLst>
+  </p:cSld>
+  <p:clrMapOvr>
+    <a:masterClrMapping/>
+  </p:clrMapOvr>
+</p:sld>
+</file>
+
+<file path=ppt/slides/slide12.xml><?xml version="1.0" encoding="utf-8"?>
+<p:sld xmlns:a="http://schemas.openxmlformats.org/drawingml/2006/main" xmlns:r="http://schemas.openxmlformats.org/officeDocument/2006/relationships" xmlns:p="http://schemas.openxmlformats.org/presentationml/2006/main">
+  <p:cSld>
+    <p:spTree>
+      <p:nvGrpSpPr>
+        <p:cNvPr id="1" name=""/>
+        <p:cNvGrpSpPr/>
+        <p:nvPr/>
+      </p:nvGrpSpPr>
+      <p:grpSpPr>
+        <a:xfrm>
+          <a:off x="0" y="0"/>
+          <a:ext cx="0" cy="0"/>
+          <a:chOff x="0" y="0"/>
+          <a:chExt cx="0" cy="0"/>
+        </a:xfrm>
+      </p:grpSpPr>
+      <p:sp>
+        <p:nvSpPr>
+          <p:cNvPr id="2" name="Title 1">
+            <a:extLst>
+              <a:ext uri="{FF2B5EF4-FFF2-40B4-BE49-F238E27FC236}">
+                <a16:creationId xmlns:a16="http://schemas.microsoft.com/office/drawing/2014/main" id="{ACB70F7A-C564-4898-A813-66AB30C4C9C6}"/>
+              </a:ext>
+            </a:extLst>
+          </p:cNvPr>
+          <p:cNvSpPr>
+            <a:spLocks noGrp="1"/>
+          </p:cNvSpPr>
+          <p:nvPr>
+            <p:ph type="title"/>
+          </p:nvPr>
+        </p:nvSpPr>
+        <p:spPr/>
+        <p:txBody>
+          <a:bodyPr/>
+          <a:lstStyle/>
+          <a:p>
+            <a:r>
+              <a:rPr lang="en-US" dirty="0"/>
+              <a:t>Design Risks - Manser</a:t>
+            </a:r>
+          </a:p>
+        </p:txBody>
+      </p:sp>
+      <p:sp>
+        <p:nvSpPr>
+          <p:cNvPr id="3" name="Content Placeholder 2">
+            <a:extLst>
+              <a:ext uri="{FF2B5EF4-FFF2-40B4-BE49-F238E27FC236}">
+                <a16:creationId xmlns:a16="http://schemas.microsoft.com/office/drawing/2014/main" id="{9DBC32CA-7E48-4E4A-B9E1-39CAA8487C7B}"/>
+              </a:ext>
+            </a:extLst>
+          </p:cNvPr>
+          <p:cNvSpPr>
+            <a:spLocks noGrp="1"/>
+          </p:cNvSpPr>
+          <p:nvPr>
+            <p:ph idx="1"/>
+          </p:nvPr>
+        </p:nvSpPr>
+        <p:spPr/>
+        <p:txBody>
+          <a:bodyPr/>
+          <a:lstStyle/>
+          <a:p>
+            <a:r>
+              <a:rPr lang="en-US" dirty="0"/>
+              <a:t>Lots of cross-platforming to ensure compatibility on all devices.</a:t>
+            </a:r>
+          </a:p>
+          <a:p>
+            <a:r>
+              <a:rPr lang="en-US" dirty="0"/>
+              <a:t>Had to experiment with many Applications to ensure </a:t>
+            </a:r>
+          </a:p>
+          <a:p>
+            <a:r>
+              <a:rPr lang="en-US" dirty="0"/>
+              <a:t>Application during testing would often bug out, would have to reset the device and application to start programming again.</a:t>
+            </a:r>
+          </a:p>
+          <a:p>
+            <a:r>
+              <a:rPr lang="en-US" dirty="0"/>
+              <a:t>Lack of experience with the software increased the time of completing </a:t>
+            </a:r>
+            <a:r>
+              <a:rPr lang="en-US"/>
+              <a:t>many steps.</a:t>
+            </a:r>
+            <a:endParaRPr lang="en-US" dirty="0"/>
+          </a:p>
+        </p:txBody>
+      </p:sp>
+    </p:spTree>
+    <p:extLst>
+      <p:ext uri="{BB962C8B-B14F-4D97-AF65-F5344CB8AC3E}">
+        <p14:creationId xmlns:p14="http://schemas.microsoft.com/office/powerpoint/2010/main" val="129311500"/>
+      </p:ext>
+    </p:extLst>
+  </p:cSld>
+  <p:clrMapOvr>
+    <a:masterClrMapping/>
+  </p:clrMapOvr>
+</p:sld>
+</file>
+
+<file path=ppt/slides/slide13.xml><?xml version="1.0" encoding="utf-8"?>
+<p:sld xmlns:a="http://schemas.openxmlformats.org/drawingml/2006/main" xmlns:r="http://schemas.openxmlformats.org/officeDocument/2006/relationships" xmlns:p="http://schemas.openxmlformats.org/presentationml/2006/main">
+  <p:cSld>
+    <p:spTree>
+      <p:nvGrpSpPr>
+        <p:cNvPr id="1" name=""/>
+        <p:cNvGrpSpPr/>
+        <p:nvPr/>
+      </p:nvGrpSpPr>
+      <p:grpSpPr>
+        <a:xfrm>
+          <a:off x="0" y="0"/>
+          <a:ext cx="0" cy="0"/>
+          <a:chOff x="0" y="0"/>
+          <a:chExt cx="0" cy="0"/>
+        </a:xfrm>
+      </p:grpSpPr>
+      <p:sp>
+        <p:nvSpPr>
+          <p:cNvPr id="2" name="Title 1">
+            <a:extLst>
+              <a:ext uri="{FF2B5EF4-FFF2-40B4-BE49-F238E27FC236}">
+                <a16:creationId xmlns:a16="http://schemas.microsoft.com/office/drawing/2014/main" id="{5E70C20B-3ADA-4389-B2FA-957ECE970800}"/>
+              </a:ext>
+            </a:extLst>
+          </p:cNvPr>
+          <p:cNvSpPr>
+            <a:spLocks noGrp="1"/>
+          </p:cNvSpPr>
+          <p:nvPr>
+            <p:ph type="title"/>
+          </p:nvPr>
+        </p:nvSpPr>
+        <p:spPr/>
+        <p:txBody>
+          <a:bodyPr/>
+          <a:lstStyle/>
+          <a:p>
+            <a:r>
+              <a:rPr lang="en-US" dirty="0"/>
+              <a:t>Approach to Test Requirements</a:t>
+            </a:r>
+          </a:p>
+        </p:txBody>
+      </p:sp>
+      <p:sp>
+        <p:nvSpPr>
+          <p:cNvPr id="3" name="Content Placeholder 2">
+            <a:extLst>
+              <a:ext uri="{FF2B5EF4-FFF2-40B4-BE49-F238E27FC236}">
+                <a16:creationId xmlns:a16="http://schemas.microsoft.com/office/drawing/2014/main" id="{FE3DED99-4148-4DBF-9161-9805836F9596}"/>
+              </a:ext>
+            </a:extLst>
+          </p:cNvPr>
+          <p:cNvSpPr>
+            <a:spLocks noGrp="1"/>
+          </p:cNvSpPr>
+          <p:nvPr>
+            <p:ph idx="1"/>
+          </p:nvPr>
+        </p:nvSpPr>
+        <p:spPr/>
+        <p:txBody>
+          <a:bodyPr/>
+          <a:lstStyle/>
+          <a:p>
+            <a:r>
+              <a:rPr lang="en-US" dirty="0"/>
+              <a:t>A spreadsheet was made detailing the requirements and the steps it takes to fulfill them</a:t>
+            </a:r>
+          </a:p>
+          <a:p>
+            <a:r>
+              <a:rPr lang="en-US" dirty="0"/>
+              <a:t>The spreadsheet detailed a complete user experience navigating through the various features of the app and the tracker</a:t>
+            </a:r>
+          </a:p>
+          <a:p>
+            <a:endParaRPr lang="en-US" dirty="0"/>
+          </a:p>
+        </p:txBody>
+      </p:sp>
+    </p:spTree>
+    <p:extLst>
+      <p:ext uri="{BB962C8B-B14F-4D97-AF65-F5344CB8AC3E}">
+        <p14:creationId xmlns:p14="http://schemas.microsoft.com/office/powerpoint/2010/main" val="3186244896"/>
+      </p:ext>
+    </p:extLst>
+  </p:cSld>
+  <p:clrMapOvr>
+    <a:masterClrMapping/>
+  </p:clrMapOvr>
+</p:sld>
+</file>
+
+<file path=ppt/slides/slide14.xml><?xml version="1.0" encoding="utf-8"?>
+<p:sld xmlns:a="http://schemas.openxmlformats.org/drawingml/2006/main" xmlns:r="http://schemas.openxmlformats.org/officeDocument/2006/relationships" xmlns:p="http://schemas.openxmlformats.org/presentationml/2006/main">
+  <p:cSld>
+    <p:spTree>
+      <p:nvGrpSpPr>
+        <p:cNvPr id="1" name=""/>
+        <p:cNvGrpSpPr/>
+        <p:nvPr/>
+      </p:nvGrpSpPr>
+      <p:grpSpPr>
+        <a:xfrm>
+          <a:off x="0" y="0"/>
+          <a:ext cx="0" cy="0"/>
+          <a:chOff x="0" y="0"/>
+          <a:chExt cx="0" cy="0"/>
+        </a:xfrm>
+      </p:grpSpPr>
+      <p:sp>
+        <p:nvSpPr>
+          <p:cNvPr id="2" name="Title 1">
+            <a:extLst>
+              <a:ext uri="{FF2B5EF4-FFF2-40B4-BE49-F238E27FC236}">
+                <a16:creationId xmlns:a16="http://schemas.microsoft.com/office/drawing/2014/main" id="{EB6B9FB1-D0AE-4BAC-800F-442A41EC7908}"/>
+              </a:ext>
+            </a:extLst>
+          </p:cNvPr>
+          <p:cNvSpPr>
+            <a:spLocks noGrp="1"/>
+          </p:cNvSpPr>
+          <p:nvPr>
+            <p:ph type="title"/>
+          </p:nvPr>
+        </p:nvSpPr>
+        <p:spPr/>
+        <p:txBody>
+          <a:bodyPr/>
+          <a:lstStyle/>
+          <a:p>
+            <a:r>
+              <a:rPr lang="en-US" dirty="0"/>
+              <a:t>Summary of Results</a:t>
+            </a:r>
+          </a:p>
+        </p:txBody>
+      </p:sp>
+      <p:sp>
+        <p:nvSpPr>
+          <p:cNvPr id="3" name="Content Placeholder 2">
+            <a:extLst>
+              <a:ext uri="{FF2B5EF4-FFF2-40B4-BE49-F238E27FC236}">
+                <a16:creationId xmlns:a16="http://schemas.microsoft.com/office/drawing/2014/main" id="{69417E1A-3C29-493C-8931-77F9F42D5D33}"/>
+              </a:ext>
+            </a:extLst>
+          </p:cNvPr>
+          <p:cNvSpPr>
+            <a:spLocks noGrp="1"/>
+          </p:cNvSpPr>
+          <p:nvPr>
+            <p:ph idx="1"/>
+          </p:nvPr>
+        </p:nvSpPr>
+        <p:spPr/>
+        <p:txBody>
+          <a:bodyPr/>
+          <a:lstStyle/>
+          <a:p>
+            <a:endParaRPr lang="en-US" dirty="0"/>
+          </a:p>
+        </p:txBody>
+      </p:sp>
+    </p:spTree>
+    <p:extLst>
+      <p:ext uri="{BB962C8B-B14F-4D97-AF65-F5344CB8AC3E}">
+        <p14:creationId xmlns:p14="http://schemas.microsoft.com/office/powerpoint/2010/main" val="916257301"/>
+      </p:ext>
+    </p:extLst>
+  </p:cSld>
+  <p:clrMapOvr>
+    <a:masterClrMapping/>
+  </p:clrMapOvr>
+</p:sld>
+</file>
+
+<file path=ppt/slides/slide15.xml><?xml version="1.0" encoding="utf-8"?>
+<p:sld xmlns:a="http://schemas.openxmlformats.org/drawingml/2006/main" xmlns:r="http://schemas.openxmlformats.org/officeDocument/2006/relationships" xmlns:p="http://schemas.openxmlformats.org/presentationml/2006/main">
+  <p:cSld>
+    <p:spTree>
+      <p:nvGrpSpPr>
+        <p:cNvPr id="1" name=""/>
+        <p:cNvGrpSpPr/>
+        <p:nvPr/>
+      </p:nvGrpSpPr>
+      <p:grpSpPr>
+        <a:xfrm>
+          <a:off x="0" y="0"/>
+          <a:ext cx="0" cy="0"/>
+          <a:chOff x="0" y="0"/>
+          <a:chExt cx="0" cy="0"/>
+        </a:xfrm>
+      </p:grpSpPr>
+      <p:sp>
+        <p:nvSpPr>
+          <p:cNvPr id="2" name="Title 1">
+            <a:extLst>
+              <a:ext uri="{FF2B5EF4-FFF2-40B4-BE49-F238E27FC236}">
+                <a16:creationId xmlns:a16="http://schemas.microsoft.com/office/drawing/2014/main" id="{EF9F1713-6B70-4D3B-89ED-A201D4A2F6D0}"/>
+              </a:ext>
+            </a:extLst>
+          </p:cNvPr>
+          <p:cNvSpPr>
+            <a:spLocks noGrp="1"/>
+          </p:cNvSpPr>
+          <p:nvPr>
+            <p:ph type="title"/>
+          </p:nvPr>
+        </p:nvSpPr>
+        <p:spPr/>
+        <p:txBody>
+          <a:bodyPr/>
+          <a:lstStyle/>
+          <a:p>
+            <a:r>
+              <a:rPr lang="en-US" dirty="0"/>
+              <a:t>Lessons Learned</a:t>
+            </a:r>
+          </a:p>
+        </p:txBody>
+      </p:sp>
+      <p:sp>
+        <p:nvSpPr>
+          <p:cNvPr id="3" name="Content Placeholder 2">
+            <a:extLst>
+              <a:ext uri="{FF2B5EF4-FFF2-40B4-BE49-F238E27FC236}">
+                <a16:creationId xmlns:a16="http://schemas.microsoft.com/office/drawing/2014/main" id="{41A76DB5-24D8-4F40-BDB3-75B7C6D28816}"/>
+              </a:ext>
+            </a:extLst>
+          </p:cNvPr>
+          <p:cNvSpPr>
+            <a:spLocks noGrp="1"/>
+          </p:cNvSpPr>
+          <p:nvPr>
+            <p:ph idx="1"/>
+          </p:nvPr>
+        </p:nvSpPr>
+        <p:spPr/>
+        <p:txBody>
+          <a:bodyPr/>
+          <a:lstStyle/>
+          <a:p>
+            <a:r>
+              <a:rPr lang="en-US" dirty="0"/>
+              <a:t>Research needed to be deeper. Some things were either overlooked or we did not know we needed them.</a:t>
+            </a:r>
+          </a:p>
+          <a:p>
+            <a:r>
+              <a:rPr lang="en-US" dirty="0"/>
+              <a:t>Communication is important. Very important. It hurts how important.</a:t>
+            </a:r>
+          </a:p>
+          <a:p>
+            <a:r>
+              <a:rPr lang="en-US" dirty="0"/>
+              <a:t>Had functional design flow, but needed more visual design flow</a:t>
+            </a:r>
+          </a:p>
+          <a:p>
+            <a:r>
+              <a:rPr lang="en-US" dirty="0"/>
+              <a:t>Needed more/better validation steps for completing tasks</a:t>
+            </a:r>
+          </a:p>
+          <a:p>
+            <a:endParaRPr lang="en-US" dirty="0"/>
+          </a:p>
+        </p:txBody>
+      </p:sp>
+    </p:spTree>
+    <p:extLst>
+      <p:ext uri="{BB962C8B-B14F-4D97-AF65-F5344CB8AC3E}">
+        <p14:creationId xmlns:p14="http://schemas.microsoft.com/office/powerpoint/2010/main" val="1174395209"/>
+      </p:ext>
+    </p:extLst>
+  </p:cSld>
+  <p:clrMapOvr>
+    <a:masterClrMapping/>
+  </p:clrMapOvr>
+</p:sld>
+</file>
+
+<file path=ppt/slides/slide16.xml><?xml version="1.0" encoding="utf-8"?>
+<p:sld xmlns:a="http://schemas.openxmlformats.org/drawingml/2006/main" xmlns:r="http://schemas.openxmlformats.org/officeDocument/2006/relationships" xmlns:p="http://schemas.openxmlformats.org/presentationml/2006/main">
+  <p:cSld>
+    <p:spTree>
+      <p:nvGrpSpPr>
+        <p:cNvPr id="1" name=""/>
+        <p:cNvGrpSpPr/>
+        <p:nvPr/>
+      </p:nvGrpSpPr>
+      <p:grpSpPr>
+        <a:xfrm>
+          <a:off x="0" y="0"/>
+          <a:ext cx="0" cy="0"/>
+          <a:chOff x="0" y="0"/>
+          <a:chExt cx="0" cy="0"/>
+        </a:xfrm>
+      </p:grpSpPr>
+      <p:sp>
+        <p:nvSpPr>
+          <p:cNvPr id="2" name="Title 1">
+            <a:extLst>
+              <a:ext uri="{FF2B5EF4-FFF2-40B4-BE49-F238E27FC236}">
+                <a16:creationId xmlns:a16="http://schemas.microsoft.com/office/drawing/2014/main" id="{C48304D9-F828-45FF-9F86-3AF3ACD9A2F9}"/>
+              </a:ext>
+            </a:extLst>
+          </p:cNvPr>
+          <p:cNvSpPr>
+            <a:spLocks noGrp="1"/>
+          </p:cNvSpPr>
+          <p:nvPr>
+            <p:ph type="title"/>
+          </p:nvPr>
+        </p:nvSpPr>
+        <p:spPr/>
+        <p:txBody>
+          <a:bodyPr/>
+          <a:lstStyle/>
+          <a:p>
+            <a:r>
+              <a:rPr lang="en-US" dirty="0"/>
+              <a:t>What We Should Have Done Differently</a:t>
+            </a:r>
+          </a:p>
+        </p:txBody>
+      </p:sp>
+      <p:sp>
+        <p:nvSpPr>
+          <p:cNvPr id="3" name="Content Placeholder 2">
+            <a:extLst>
+              <a:ext uri="{FF2B5EF4-FFF2-40B4-BE49-F238E27FC236}">
+                <a16:creationId xmlns:a16="http://schemas.microsoft.com/office/drawing/2014/main" id="{D30BD8A0-F932-40A0-A4BC-BFF7AC5DE563}"/>
+              </a:ext>
+            </a:extLst>
+          </p:cNvPr>
+          <p:cNvSpPr>
+            <a:spLocks noGrp="1"/>
+          </p:cNvSpPr>
+          <p:nvPr>
+            <p:ph idx="1"/>
+          </p:nvPr>
+        </p:nvSpPr>
+        <p:spPr/>
+        <p:txBody>
+          <a:bodyPr/>
+          <a:lstStyle/>
+          <a:p>
+            <a:r>
+              <a:rPr lang="en-US" dirty="0"/>
+              <a:t>Should have divided milestones into more concrete tasks</a:t>
+            </a:r>
+          </a:p>
+          <a:p>
+            <a:r>
+              <a:rPr lang="en-US" dirty="0"/>
+              <a:t>Should have done application design as a group at the beginning</a:t>
+            </a:r>
+          </a:p>
+          <a:p>
+            <a:r>
+              <a:rPr lang="en-US" dirty="0"/>
+              <a:t>Should have used online tools such as GitHub and Slack more often and more consistently</a:t>
+            </a:r>
+          </a:p>
+          <a:p>
+            <a:r>
+              <a:rPr lang="en-US" dirty="0"/>
+              <a:t>Should have bugged each other to get tasked done</a:t>
+            </a:r>
+          </a:p>
+          <a:p>
+            <a:r>
+              <a:rPr lang="en-US" dirty="0"/>
+              <a:t>A strike did not help</a:t>
+            </a:r>
+          </a:p>
+          <a:p>
+            <a:r>
+              <a:rPr lang="en-US" dirty="0"/>
+              <a:t>Should have began and consistently worked on chip programming</a:t>
+            </a:r>
+          </a:p>
+          <a:p>
+            <a:endParaRPr lang="en-US" dirty="0"/>
+          </a:p>
+        </p:txBody>
+      </p:sp>
+    </p:spTree>
+    <p:extLst>
+      <p:ext uri="{BB962C8B-B14F-4D97-AF65-F5344CB8AC3E}">
+        <p14:creationId xmlns:p14="http://schemas.microsoft.com/office/powerpoint/2010/main" val="4028414131"/>
+      </p:ext>
+    </p:extLst>
+  </p:cSld>
+  <p:clrMapOvr>
+    <a:masterClrMapping/>
+  </p:clrMapOvr>
+</p:sld>
+</file>
+
+<file path=ppt/slides/slide17.xml><?xml version="1.0" encoding="utf-8"?>
+<p:sld xmlns:a="http://schemas.openxmlformats.org/drawingml/2006/main" xmlns:r="http://schemas.openxmlformats.org/officeDocument/2006/relationships" xmlns:p="http://schemas.openxmlformats.org/presentationml/2006/main">
+  <p:cSld>
+    <p:spTree>
+      <p:nvGrpSpPr>
+        <p:cNvPr id="1" name=""/>
+        <p:cNvGrpSpPr/>
+        <p:nvPr/>
+      </p:nvGrpSpPr>
+      <p:grpSpPr>
+        <a:xfrm>
+          <a:off x="0" y="0"/>
+          <a:ext cx="0" cy="0"/>
+          <a:chOff x="0" y="0"/>
+          <a:chExt cx="0" cy="0"/>
+        </a:xfrm>
+      </p:grpSpPr>
+      <p:sp>
+        <p:nvSpPr>
+          <p:cNvPr id="2" name="Title 1">
+            <a:extLst>
+              <a:ext uri="{FF2B5EF4-FFF2-40B4-BE49-F238E27FC236}">
                 <a16:creationId xmlns:a16="http://schemas.microsoft.com/office/drawing/2014/main" id="{5152F598-412A-4BBA-9469-D7FA6692E961}"/>
               </a:ext>
             </a:extLst>
@@ -6020,7 +6690,61 @@
           <a:bodyPr/>
           <a:lstStyle/>
           <a:p>
-            <a:endParaRPr lang="en-US"/>
+            <a:r>
+              <a:rPr lang="en-US" dirty="0"/>
+              <a:t>Our project had a chance to work</a:t>
+            </a:r>
+          </a:p>
+          <a:p>
+            <a:r>
+              <a:rPr lang="en-US" dirty="0"/>
+              <a:t>Setbacks include </a:t>
+            </a:r>
+          </a:p>
+          <a:p>
+            <a:pPr lvl="1"/>
+            <a:r>
+              <a:rPr lang="en-US" dirty="0"/>
+              <a:t>Unexpected complexities</a:t>
+            </a:r>
+          </a:p>
+          <a:p>
+            <a:pPr lvl="1"/>
+            <a:r>
+              <a:rPr lang="en-US" dirty="0"/>
+              <a:t>Lack of use of online tools</a:t>
+            </a:r>
+          </a:p>
+          <a:p>
+            <a:pPr lvl="1"/>
+            <a:r>
+              <a:rPr lang="en-US" dirty="0"/>
+              <a:t>Lack of communication</a:t>
+            </a:r>
+          </a:p>
+          <a:p>
+            <a:pPr lvl="1"/>
+            <a:r>
+              <a:rPr lang="en-US" dirty="0"/>
+              <a:t>Lack of concrete design</a:t>
+            </a:r>
+          </a:p>
+          <a:p>
+            <a:pPr lvl="1"/>
+            <a:r>
+              <a:rPr lang="en-US" dirty="0"/>
+              <a:t>Parts not coming in at optimal time</a:t>
+            </a:r>
+          </a:p>
+          <a:p>
+            <a:pPr lvl="1"/>
+            <a:r>
+              <a:rPr lang="en-US" dirty="0"/>
+              <a:t>Lack of solid process to meet milestones</a:t>
+            </a:r>
+          </a:p>
+          <a:p>
+            <a:endParaRPr lang="en-US" dirty="0"/>
           </a:p>
         </p:txBody>
       </p:sp>
@@ -6325,13 +7049,13 @@
           <a:p>
             <a:r>
               <a:rPr lang="en-US" dirty="0"/>
-              <a:t>Taylor – </a:t>
-            </a:r>
-          </a:p>
-          <a:p>
-            <a:r>
-              <a:rPr lang="en-US" dirty="0"/>
-              <a:t>Aljagthmi – </a:t>
+              <a:t>Taylor – Database and communication between app and chip</a:t>
+            </a:r>
+          </a:p>
+          <a:p>
+            <a:r>
+              <a:rPr lang="en-US" dirty="0"/>
+              <a:t>Aljagthmi – GUI and App development</a:t>
             </a:r>
           </a:p>
           <a:p>
@@ -6439,7 +7163,10 @@
             </a:r>
           </a:p>
           <a:p>
-            <a:endParaRPr lang="en-US" dirty="0"/>
+            <a:r>
+              <a:rPr lang="en-US" dirty="0"/>
+              <a:t>(Unexpected) Program chip to connect to a TCP server</a:t>
+            </a:r>
           </a:p>
         </p:txBody>
       </p:sp>
@@ -6478,7 +7205,7 @@
           <p:cNvPr id="2" name="Title 1">
             <a:extLst>
               <a:ext uri="{FF2B5EF4-FFF2-40B4-BE49-F238E27FC236}">
-                <a16:creationId xmlns:a16="http://schemas.microsoft.com/office/drawing/2014/main" id="{3CC41E14-5ABF-4038-AFF2-372E71C057F6}"/>
+                <a16:creationId xmlns:a16="http://schemas.microsoft.com/office/drawing/2014/main" id="{439EF911-858A-4EF0-9C8A-D384AA026C3F}"/>
               </a:ext>
             </a:extLst>
           </p:cNvPr>
@@ -6496,7 +7223,7 @@
           <a:p>
             <a:r>
               <a:rPr lang="en-US" dirty="0"/>
-              <a:t>Design Approach - Taylor</a:t>
+              <a:t>Design Risks - Ly</a:t>
             </a:r>
           </a:p>
         </p:txBody>
@@ -6506,7 +7233,7 @@
           <p:cNvPr id="3" name="Content Placeholder 2">
             <a:extLst>
               <a:ext uri="{FF2B5EF4-FFF2-40B4-BE49-F238E27FC236}">
-                <a16:creationId xmlns:a16="http://schemas.microsoft.com/office/drawing/2014/main" id="{A70E766E-0C89-457A-8DE2-33B2CE6EEC40}"/>
+                <a16:creationId xmlns:a16="http://schemas.microsoft.com/office/drawing/2014/main" id="{218B8133-A624-4536-9E7E-A80EE497C814}"/>
               </a:ext>
             </a:extLst>
           </p:cNvPr>
@@ -6522,14 +7249,32 @@
           <a:bodyPr/>
           <a:lstStyle/>
           <a:p>
-            <a:endParaRPr lang="en-US"/>
+            <a:r>
+              <a:rPr lang="en-US" dirty="0"/>
+              <a:t>Highly dependent on parts arriving on time</a:t>
+            </a:r>
+          </a:p>
+          <a:p>
+            <a:r>
+              <a:rPr lang="en-US" dirty="0"/>
+              <a:t>Soldering experience was necessary for the tasks (had prior experience already)</a:t>
+            </a:r>
+          </a:p>
+          <a:p>
+            <a:r>
+              <a:rPr lang="en-US" dirty="0"/>
+              <a:t>Lack of communication with Manser. Ly programmed ESP8266 to establish TCP socket connection with server that Taylor made</a:t>
+            </a:r>
+          </a:p>
+          <a:p>
+            <a:endParaRPr lang="en-US" dirty="0"/>
           </a:p>
         </p:txBody>
       </p:sp>
     </p:spTree>
     <p:extLst>
       <p:ext uri="{BB962C8B-B14F-4D97-AF65-F5344CB8AC3E}">
-        <p14:creationId xmlns:p14="http://schemas.microsoft.com/office/powerpoint/2010/main" val="2919696105"/>
+        <p14:creationId xmlns:p14="http://schemas.microsoft.com/office/powerpoint/2010/main" val="274284700"/>
       </p:ext>
     </p:extLst>
   </p:cSld>
@@ -6561,7 +7306,7 @@
           <p:cNvPr id="2" name="Title 1">
             <a:extLst>
               <a:ext uri="{FF2B5EF4-FFF2-40B4-BE49-F238E27FC236}">
-                <a16:creationId xmlns:a16="http://schemas.microsoft.com/office/drawing/2014/main" id="{5BBEC34F-FCF5-4099-8B90-D49AAB05EDA9}"/>
+                <a16:creationId xmlns:a16="http://schemas.microsoft.com/office/drawing/2014/main" id="{3CC41E14-5ABF-4038-AFF2-372E71C057F6}"/>
               </a:ext>
             </a:extLst>
           </p:cNvPr>
@@ -6579,7 +7324,7 @@
           <a:p>
             <a:r>
               <a:rPr lang="en-US" dirty="0"/>
-              <a:t>Design Approach - Aljagthmi</a:t>
+              <a:t>Design Approach - Taylor</a:t>
             </a:r>
           </a:p>
         </p:txBody>
@@ -6589,7 +7334,7 @@
           <p:cNvPr id="3" name="Content Placeholder 2">
             <a:extLst>
               <a:ext uri="{FF2B5EF4-FFF2-40B4-BE49-F238E27FC236}">
-                <a16:creationId xmlns:a16="http://schemas.microsoft.com/office/drawing/2014/main" id="{F2DCFB38-0141-4119-B074-527742AB8836}"/>
+                <a16:creationId xmlns:a16="http://schemas.microsoft.com/office/drawing/2014/main" id="{A70E766E-0C89-457A-8DE2-33B2CE6EEC40}"/>
               </a:ext>
             </a:extLst>
           </p:cNvPr>
@@ -6605,14 +7350,41 @@
           <a:bodyPr/>
           <a:lstStyle/>
           <a:p>
-            <a:endParaRPr lang="en-US"/>
+            <a:r>
+              <a:rPr lang="en-US" dirty="0"/>
+              <a:t>Developing and integrating the Firebase database</a:t>
+            </a:r>
+          </a:p>
+          <a:p>
+            <a:r>
+              <a:rPr lang="en-US" dirty="0"/>
+              <a:t>Developing and integrating background services between server and chip</a:t>
+            </a:r>
+          </a:p>
+          <a:p>
+            <a:r>
+              <a:rPr lang="en-US" dirty="0"/>
+              <a:t>(Unexpected) Designing app layout</a:t>
+            </a:r>
+          </a:p>
+          <a:p>
+            <a:r>
+              <a:rPr lang="en-US" dirty="0"/>
+              <a:t>(Unexpected) Setting up TCP server</a:t>
+            </a:r>
+          </a:p>
+          <a:p>
+            <a:r>
+              <a:rPr lang="en-US" dirty="0"/>
+              <a:t>(Unexpected) Helped Ly with programming chip to communicate with TCP server</a:t>
+            </a:r>
           </a:p>
         </p:txBody>
       </p:sp>
     </p:spTree>
     <p:extLst>
       <p:ext uri="{BB962C8B-B14F-4D97-AF65-F5344CB8AC3E}">
-        <p14:creationId xmlns:p14="http://schemas.microsoft.com/office/powerpoint/2010/main" val="3344463300"/>
+        <p14:creationId xmlns:p14="http://schemas.microsoft.com/office/powerpoint/2010/main" val="2919696105"/>
       </p:ext>
     </p:extLst>
   </p:cSld>
@@ -6644,7 +7416,7 @@
           <p:cNvPr id="2" name="Title 1">
             <a:extLst>
               <a:ext uri="{FF2B5EF4-FFF2-40B4-BE49-F238E27FC236}">
-                <a16:creationId xmlns:a16="http://schemas.microsoft.com/office/drawing/2014/main" id="{D4AA106D-6998-44BC-BD6A-37D6EDB62754}"/>
+                <a16:creationId xmlns:a16="http://schemas.microsoft.com/office/drawing/2014/main" id="{234D00C7-B52F-471A-A404-FB7B31714E45}"/>
               </a:ext>
             </a:extLst>
           </p:cNvPr>
@@ -6662,7 +7434,7 @@
           <a:p>
             <a:r>
               <a:rPr lang="en-US" dirty="0"/>
-              <a:t>Design Approach - Manser</a:t>
+              <a:t>Design Risks - Taylor</a:t>
             </a:r>
           </a:p>
         </p:txBody>
@@ -6672,7 +7444,7 @@
           <p:cNvPr id="3" name="Content Placeholder 2">
             <a:extLst>
               <a:ext uri="{FF2B5EF4-FFF2-40B4-BE49-F238E27FC236}">
-                <a16:creationId xmlns:a16="http://schemas.microsoft.com/office/drawing/2014/main" id="{61DC3010-D79E-4888-BEA9-4A4F267442AF}"/>
+                <a16:creationId xmlns:a16="http://schemas.microsoft.com/office/drawing/2014/main" id="{0AC97FEC-2DE0-4F1C-96E2-3B4F706EFF13}"/>
               </a:ext>
             </a:extLst>
           </p:cNvPr>
@@ -6688,14 +7460,43 @@
           <a:bodyPr/>
           <a:lstStyle/>
           <a:p>
-            <a:endParaRPr lang="en-US"/>
+            <a:r>
+              <a:rPr lang="en-US" dirty="0"/>
+              <a:t>Android OREO kills long running background services</a:t>
+            </a:r>
+          </a:p>
+          <a:p>
+            <a:r>
+              <a:rPr lang="en-US" dirty="0"/>
+              <a:t>(Requirement creep) Project and </a:t>
+            </a:r>
+            <a:r>
+              <a:rPr lang="en-US" dirty="0" err="1"/>
+              <a:t>Redpin</a:t>
+            </a:r>
+            <a:r>
+              <a:rPr lang="en-US" dirty="0"/>
+              <a:t> required a server for constant communication</a:t>
+            </a:r>
+          </a:p>
+          <a:p>
+            <a:r>
+              <a:rPr lang="en-US" dirty="0"/>
+              <a:t>Integration reliant on having a fully developed application and programmed chip</a:t>
+            </a:r>
+          </a:p>
+          <a:p>
+            <a:endParaRPr lang="en-US" dirty="0"/>
+          </a:p>
+          <a:p>
+            <a:endParaRPr lang="en-US" dirty="0"/>
           </a:p>
         </p:txBody>
       </p:sp>
     </p:spTree>
     <p:extLst>
       <p:ext uri="{BB962C8B-B14F-4D97-AF65-F5344CB8AC3E}">
-        <p14:creationId xmlns:p14="http://schemas.microsoft.com/office/powerpoint/2010/main" val="3562799535"/>
+        <p14:creationId xmlns:p14="http://schemas.microsoft.com/office/powerpoint/2010/main" val="2876637666"/>
       </p:ext>
     </p:extLst>
   </p:cSld>
@@ -6727,7 +7528,7 @@
           <p:cNvPr id="2" name="Title 1">
             <a:extLst>
               <a:ext uri="{FF2B5EF4-FFF2-40B4-BE49-F238E27FC236}">
-                <a16:creationId xmlns:a16="http://schemas.microsoft.com/office/drawing/2014/main" id="{5E70C20B-3ADA-4389-B2FA-957ECE970800}"/>
+                <a16:creationId xmlns:a16="http://schemas.microsoft.com/office/drawing/2014/main" id="{5BBEC34F-FCF5-4099-8B90-D49AAB05EDA9}"/>
               </a:ext>
             </a:extLst>
           </p:cNvPr>
@@ -6738,14 +7539,19 @@
             <p:ph type="title"/>
           </p:nvPr>
         </p:nvSpPr>
-        <p:spPr/>
-        <p:txBody>
-          <a:bodyPr/>
-          <a:lstStyle/>
-          <a:p>
-            <a:r>
-              <a:rPr lang="en-US" dirty="0"/>
-              <a:t>Approach to Test Requirements</a:t>
+        <p:spPr>
+          <a:xfrm>
+            <a:off x="677334" y="525569"/>
+            <a:ext cx="8596668" cy="1320800"/>
+          </a:xfrm>
+        </p:spPr>
+        <p:txBody>
+          <a:bodyPr/>
+          <a:lstStyle/>
+          <a:p>
+            <a:r>
+              <a:rPr lang="en-US" dirty="0"/>
+              <a:t>Design Approach - Aljagthmi</a:t>
             </a:r>
           </a:p>
         </p:txBody>
@@ -6755,7 +7561,7 @@
           <p:cNvPr id="3" name="Content Placeholder 2">
             <a:extLst>
               <a:ext uri="{FF2B5EF4-FFF2-40B4-BE49-F238E27FC236}">
-                <a16:creationId xmlns:a16="http://schemas.microsoft.com/office/drawing/2014/main" id="{FE3DED99-4148-4DBF-9161-9805836F9596}"/>
+                <a16:creationId xmlns:a16="http://schemas.microsoft.com/office/drawing/2014/main" id="{F2DCFB38-0141-4119-B074-527742AB8836}"/>
               </a:ext>
             </a:extLst>
           </p:cNvPr>
@@ -6766,19 +7572,165 @@
             <p:ph idx="1"/>
           </p:nvPr>
         </p:nvSpPr>
-        <p:spPr/>
-        <p:txBody>
-          <a:bodyPr/>
-          <a:lstStyle/>
-          <a:p>
-            <a:endParaRPr lang="en-US" dirty="0"/>
+        <p:spPr>
+          <a:xfrm>
+            <a:off x="1481104" y="1846369"/>
+            <a:ext cx="7792898" cy="4110962"/>
+          </a:xfrm>
+        </p:spPr>
+        <p:txBody>
+          <a:bodyPr>
+            <a:normAutofit/>
+          </a:bodyPr>
+          <a:lstStyle/>
+          <a:p>
+            <a:pPr lvl="0"/>
+            <a:r>
+              <a:rPr lang="en-US" sz="1600" dirty="0">
+                <a:solidFill>
+                  <a:schemeClr val="tx1"/>
+                </a:solidFill>
+              </a:rPr>
+              <a:t>Graphical user interface application designed to allow user to access and edit data stored in the database. Contains two subsystems:</a:t>
+            </a:r>
+          </a:p>
+          <a:p>
+            <a:pPr lvl="1">
+              <a:buFont typeface="+mj-lt"/>
+              <a:buAutoNum type="romanUcPeriod"/>
+            </a:pPr>
+            <a:r>
+              <a:rPr lang="en-US" dirty="0">
+                <a:solidFill>
+                  <a:schemeClr val="tx1"/>
+                </a:solidFill>
+              </a:rPr>
+              <a:t>Login Operations – controls the user access to the application or registration if no user data is found</a:t>
+            </a:r>
+          </a:p>
+          <a:p>
+            <a:pPr lvl="1">
+              <a:buFont typeface="+mj-lt"/>
+              <a:buAutoNum type="romanUcPeriod"/>
+            </a:pPr>
+            <a:r>
+              <a:rPr lang="en-US" dirty="0">
+                <a:solidFill>
+                  <a:schemeClr val="tx1"/>
+                </a:solidFill>
+              </a:rPr>
+              <a:t>Device Configuration – controls configuration, addition, and display of Tracker information from and to the database for the GUI </a:t>
+            </a:r>
+          </a:p>
+          <a:p>
+            <a:pPr fontAlgn="t"/>
+            <a:r>
+              <a:rPr lang="en-US" sz="1600" dirty="0">
+                <a:solidFill>
+                  <a:schemeClr val="tx1"/>
+                </a:solidFill>
+              </a:rPr>
+              <a:t>Log in page is displayed to user with username and password fields are displayed on the page</a:t>
+            </a:r>
+          </a:p>
+          <a:p>
+            <a:pPr fontAlgn="t"/>
+            <a:r>
+              <a:rPr lang="en-US" sz="1600" dirty="0">
+                <a:solidFill>
+                  <a:schemeClr val="tx1"/>
+                </a:solidFill>
+              </a:rPr>
+              <a:t>Username field should be editable and accept the username</a:t>
+            </a:r>
+          </a:p>
+          <a:p>
+            <a:pPr fontAlgn="t"/>
+            <a:r>
+              <a:rPr lang="en-US" sz="1600" dirty="0">
+                <a:solidFill>
+                  <a:schemeClr val="tx1"/>
+                </a:solidFill>
+              </a:rPr>
+              <a:t>Password field should be editable and accept the password and display as stars or dots </a:t>
+            </a:r>
+          </a:p>
+          <a:p>
+            <a:pPr fontAlgn="t"/>
+            <a:r>
+              <a:rPr lang="en-US" sz="1600" dirty="0">
+                <a:solidFill>
+                  <a:schemeClr val="tx1"/>
+                </a:solidFill>
+              </a:rPr>
+              <a:t>User should log in into application and navigate to Home page</a:t>
+            </a:r>
+          </a:p>
+          <a:p>
+            <a:pPr lvl="1">
+              <a:buFont typeface="+mj-lt"/>
+              <a:buAutoNum type="romanUcPeriod"/>
+            </a:pPr>
+            <a:endParaRPr lang="en-US" dirty="0">
+              <a:solidFill>
+                <a:schemeClr val="tx1"/>
+              </a:solidFill>
+            </a:endParaRPr>
+          </a:p>
+          <a:p>
+            <a:endParaRPr lang="en-US" sz="1600" dirty="0">
+              <a:solidFill>
+                <a:schemeClr val="tx1"/>
+              </a:solidFill>
+            </a:endParaRPr>
+          </a:p>
+          <a:p>
+            <a:endParaRPr lang="en-US" sz="1600" dirty="0">
+              <a:solidFill>
+                <a:schemeClr val="tx1"/>
+              </a:solidFill>
+            </a:endParaRPr>
+          </a:p>
+        </p:txBody>
+      </p:sp>
+      <p:sp>
+        <p:nvSpPr>
+          <p:cNvPr id="4" name="Rectangle 3">
+            <a:extLst>
+              <a:ext uri="{FF2B5EF4-FFF2-40B4-BE49-F238E27FC236}">
+                <a16:creationId xmlns:a16="http://schemas.microsoft.com/office/drawing/2014/main" id="{B6DEF48E-EC59-4C3A-98CE-2DC30574EF4A}"/>
+              </a:ext>
+            </a:extLst>
+          </p:cNvPr>
+          <p:cNvSpPr/>
+          <p:nvPr/>
+        </p:nvSpPr>
+        <p:spPr>
+          <a:xfrm>
+            <a:off x="1481104" y="1477037"/>
+            <a:ext cx="1986441" cy="369332"/>
+          </a:xfrm>
+          <a:prstGeom prst="rect">
+            <a:avLst/>
+          </a:prstGeom>
+        </p:spPr>
+        <p:txBody>
+          <a:bodyPr wrap="none">
+            <a:spAutoFit/>
+          </a:bodyPr>
+          <a:lstStyle/>
+          <a:p>
+            <a:r>
+              <a:rPr lang="en-US" dirty="0"/>
+              <a:t>GUI Development</a:t>
+            </a:r>
           </a:p>
         </p:txBody>
       </p:sp>
     </p:spTree>
     <p:extLst>
       <p:ext uri="{BB962C8B-B14F-4D97-AF65-F5344CB8AC3E}">
-        <p14:creationId xmlns:p14="http://schemas.microsoft.com/office/powerpoint/2010/main" val="3186244896"/>
+        <p14:creationId xmlns:p14="http://schemas.microsoft.com/office/powerpoint/2010/main" val="3344463300"/>
       </p:ext>
     </p:extLst>
   </p:cSld>

</xml_diff>

<commit_message>
Added Testing report files
</commit_message>
<xml_diff>
--- a/Documentation/Group27FinalPresentation.pptx
+++ b/Documentation/Group27FinalPresentation.pptx
@@ -6348,7 +6348,12 @@
             <p:ph type="title"/>
           </p:nvPr>
         </p:nvSpPr>
-        <p:spPr/>
+        <p:spPr>
+          <a:xfrm>
+            <a:off x="677334" y="609600"/>
+            <a:ext cx="8596668" cy="695152"/>
+          </a:xfrm>
+        </p:spPr>
         <p:txBody>
           <a:bodyPr/>
           <a:lstStyle/>
@@ -6362,10 +6367,10 @@
       </p:sp>
       <p:sp>
         <p:nvSpPr>
-          <p:cNvPr id="3" name="Content Placeholder 2">
+          <p:cNvPr id="5" name="Text Placeholder 4">
             <a:extLst>
               <a:ext uri="{FF2B5EF4-FFF2-40B4-BE49-F238E27FC236}">
-                <a16:creationId xmlns:a16="http://schemas.microsoft.com/office/drawing/2014/main" id="{69417E1A-3C29-493C-8931-77F9F42D5D33}"/>
+                <a16:creationId xmlns:a16="http://schemas.microsoft.com/office/drawing/2014/main" id="{79417F27-1BF1-4B69-9159-5947AE9B580A}"/>
               </a:ext>
             </a:extLst>
           </p:cNvPr>
@@ -6373,18 +6378,1796 @@
             <a:spLocks noGrp="1"/>
           </p:cNvSpPr>
           <p:nvPr>
-            <p:ph idx="1"/>
-          </p:nvPr>
-        </p:nvSpPr>
-        <p:spPr/>
+            <p:ph type="body" idx="1"/>
+          </p:nvPr>
+        </p:nvSpPr>
+        <p:spPr>
+          <a:xfrm>
+            <a:off x="675301" y="1096969"/>
+            <a:ext cx="4185623" cy="576262"/>
+          </a:xfrm>
+        </p:spPr>
         <p:txBody>
           <a:bodyPr/>
           <a:lstStyle/>
           <a:p>
-            <a:endParaRPr lang="en-US" dirty="0"/>
-          </a:p>
-        </p:txBody>
-      </p:sp>
+            <a:r>
+              <a:rPr lang="en-US" dirty="0"/>
+              <a:t>Passed Requirements</a:t>
+            </a:r>
+          </a:p>
+        </p:txBody>
+      </p:sp>
+      <p:graphicFrame>
+        <p:nvGraphicFramePr>
+          <p:cNvPr id="9" name="Content Placeholder 8">
+            <a:extLst>
+              <a:ext uri="{FF2B5EF4-FFF2-40B4-BE49-F238E27FC236}">
+                <a16:creationId xmlns:a16="http://schemas.microsoft.com/office/drawing/2014/main" id="{07EAC685-C823-4E0E-AA7F-89BD35612540}"/>
+              </a:ext>
+            </a:extLst>
+          </p:cNvPr>
+          <p:cNvGraphicFramePr>
+            <a:graphicFrameLocks noGrp="1"/>
+          </p:cNvGraphicFramePr>
+          <p:nvPr>
+            <p:ph sz="half" idx="2"/>
+            <p:extLst>
+              <p:ext uri="{D42A27DB-BD31-4B8C-83A1-F6EECF244321}">
+                <p14:modId xmlns:p14="http://schemas.microsoft.com/office/powerpoint/2010/main" val="2915850534"/>
+              </p:ext>
+            </p:extLst>
+          </p:nvPr>
+        </p:nvGraphicFramePr>
+        <p:xfrm>
+          <a:off x="675301" y="1669515"/>
+          <a:ext cx="4184649" cy="4671695"/>
+        </p:xfrm>
+        <a:graphic>
+          <a:graphicData uri="http://schemas.openxmlformats.org/drawingml/2006/table">
+            <a:tbl>
+              <a:tblPr firstRow="1" bandRow="1">
+                <a:tableStyleId>{5C22544A-7EE6-4342-B048-85BDC9FD1C3A}</a:tableStyleId>
+              </a:tblPr>
+              <a:tblGrid>
+                <a:gridCol w="961139">
+                  <a:extLst>
+                    <a:ext uri="{9D8B030D-6E8A-4147-A177-3AD203B41FA5}">
+                      <a16:colId xmlns:a16="http://schemas.microsoft.com/office/drawing/2014/main" val="2187943904"/>
+                    </a:ext>
+                  </a:extLst>
+                </a:gridCol>
+                <a:gridCol w="925033">
+                  <a:extLst>
+                    <a:ext uri="{9D8B030D-6E8A-4147-A177-3AD203B41FA5}">
+                      <a16:colId xmlns:a16="http://schemas.microsoft.com/office/drawing/2014/main" val="1733444194"/>
+                    </a:ext>
+                  </a:extLst>
+                </a:gridCol>
+                <a:gridCol w="2298477">
+                  <a:extLst>
+                    <a:ext uri="{9D8B030D-6E8A-4147-A177-3AD203B41FA5}">
+                      <a16:colId xmlns:a16="http://schemas.microsoft.com/office/drawing/2014/main" val="4203020965"/>
+                    </a:ext>
+                  </a:extLst>
+                </a:gridCol>
+              </a:tblGrid>
+              <a:tr h="370840">
+                <a:tc>
+                  <a:txBody>
+                    <a:bodyPr/>
+                    <a:lstStyle/>
+                    <a:p>
+                      <a:pPr algn="ctr" fontAlgn="ctr"/>
+                      <a:r>
+                        <a:rPr lang="en-US" sz="1100" b="0" i="0" u="none" strike="noStrike" dirty="0">
+                          <a:solidFill>
+                            <a:srgbClr val="000000"/>
+                          </a:solidFill>
+                          <a:effectLst/>
+                          <a:latin typeface="Arial" panose="020B0604020202020204" pitchFamily="34" charset="0"/>
+                        </a:rPr>
+                        <a:t>Req No.</a:t>
+                      </a:r>
+                    </a:p>
+                  </a:txBody>
+                  <a:tcPr marL="9525" marR="9525" marT="9525" marB="0" anchor="ctr"/>
+                </a:tc>
+                <a:tc>
+                  <a:txBody>
+                    <a:bodyPr/>
+                    <a:lstStyle/>
+                    <a:p>
+                      <a:pPr algn="ctr" fontAlgn="ctr"/>
+                      <a:r>
+                        <a:rPr lang="en-US" sz="1100" b="0" i="0" u="none" strike="noStrike" dirty="0">
+                          <a:solidFill>
+                            <a:srgbClr val="000000"/>
+                          </a:solidFill>
+                          <a:effectLst/>
+                          <a:latin typeface="Arial" panose="020B0604020202020204" pitchFamily="34" charset="0"/>
+                        </a:rPr>
+                        <a:t>Obj No.</a:t>
+                      </a:r>
+                    </a:p>
+                  </a:txBody>
+                  <a:tcPr marL="9525" marR="9525" marT="9525" marB="0" anchor="ctr"/>
+                </a:tc>
+                <a:tc>
+                  <a:txBody>
+                    <a:bodyPr/>
+                    <a:lstStyle/>
+                    <a:p>
+                      <a:pPr algn="l" fontAlgn="ctr"/>
+                      <a:r>
+                        <a:rPr lang="en-US" sz="1100" b="0" i="0" u="none" strike="noStrike" dirty="0">
+                          <a:solidFill>
+                            <a:srgbClr val="000000"/>
+                          </a:solidFill>
+                          <a:effectLst/>
+                          <a:latin typeface="Arial" panose="020B0604020202020204" pitchFamily="34" charset="0"/>
+                        </a:rPr>
+                        <a:t>Requirement</a:t>
+                      </a:r>
+                    </a:p>
+                  </a:txBody>
+                  <a:tcPr marL="9525" marR="9525" marT="9525" marB="0" anchor="ctr"/>
+                </a:tc>
+                <a:extLst>
+                  <a:ext uri="{0D108BD9-81ED-4DB2-BD59-A6C34878D82A}">
+                    <a16:rowId xmlns:a16="http://schemas.microsoft.com/office/drawing/2014/main" val="3259270588"/>
+                  </a:ext>
+                </a:extLst>
+              </a:tr>
+              <a:tr h="370840">
+                <a:tc>
+                  <a:txBody>
+                    <a:bodyPr/>
+                    <a:lstStyle/>
+                    <a:p>
+                      <a:pPr algn="ctr" fontAlgn="ctr"/>
+                      <a:r>
+                        <a:rPr lang="en-US" sz="1100" b="0" i="0" u="none" strike="noStrike" dirty="0">
+                          <a:solidFill>
+                            <a:srgbClr val="000000"/>
+                          </a:solidFill>
+                          <a:effectLst/>
+                          <a:latin typeface="Arial" panose="020B0604020202020204" pitchFamily="34" charset="0"/>
+                        </a:rPr>
+                        <a:t>1</a:t>
+                      </a:r>
+                    </a:p>
+                  </a:txBody>
+                  <a:tcPr marL="9525" marR="9525" marT="9525" marB="0" anchor="ctr"/>
+                </a:tc>
+                <a:tc>
+                  <a:txBody>
+                    <a:bodyPr/>
+                    <a:lstStyle/>
+                    <a:p>
+                      <a:pPr algn="ctr" fontAlgn="ctr"/>
+                      <a:r>
+                        <a:rPr lang="en-US" sz="1100" b="0" i="0" u="none" strike="noStrike">
+                          <a:solidFill>
+                            <a:srgbClr val="000000"/>
+                          </a:solidFill>
+                          <a:effectLst/>
+                          <a:latin typeface="Arial" panose="020B0604020202020204" pitchFamily="34" charset="0"/>
+                        </a:rPr>
+                        <a:t>1</a:t>
+                      </a:r>
+                    </a:p>
+                  </a:txBody>
+                  <a:tcPr marL="9525" marR="9525" marT="9525" marB="0" anchor="ctr"/>
+                </a:tc>
+                <a:tc>
+                  <a:txBody>
+                    <a:bodyPr/>
+                    <a:lstStyle/>
+                    <a:p>
+                      <a:pPr algn="l" fontAlgn="ctr"/>
+                      <a:r>
+                        <a:rPr lang="en-US" sz="1100" b="0" i="0" u="none" strike="noStrike" dirty="0">
+                          <a:solidFill>
+                            <a:srgbClr val="000000"/>
+                          </a:solidFill>
+                          <a:effectLst/>
+                          <a:latin typeface="Arial" panose="020B0604020202020204" pitchFamily="34" charset="0"/>
+                        </a:rPr>
+                        <a:t>Device shall comply with IEEE 802.11 communication standard</a:t>
+                      </a:r>
+                    </a:p>
+                  </a:txBody>
+                  <a:tcPr marL="9525" marR="9525" marT="9525" marB="0" anchor="ctr"/>
+                </a:tc>
+                <a:extLst>
+                  <a:ext uri="{0D108BD9-81ED-4DB2-BD59-A6C34878D82A}">
+                    <a16:rowId xmlns:a16="http://schemas.microsoft.com/office/drawing/2014/main" val="498468782"/>
+                  </a:ext>
+                </a:extLst>
+              </a:tr>
+              <a:tr h="370840">
+                <a:tc>
+                  <a:txBody>
+                    <a:bodyPr/>
+                    <a:lstStyle/>
+                    <a:p>
+                      <a:pPr algn="ctr" fontAlgn="ctr"/>
+                      <a:r>
+                        <a:rPr lang="en-US" sz="1100" b="0" i="0" u="none" strike="noStrike" dirty="0">
+                          <a:solidFill>
+                            <a:srgbClr val="000000"/>
+                          </a:solidFill>
+                          <a:effectLst/>
+                          <a:latin typeface="Arial" panose="020B0604020202020204" pitchFamily="34" charset="0"/>
+                        </a:rPr>
+                        <a:t>3</a:t>
+                      </a:r>
+                    </a:p>
+                  </a:txBody>
+                  <a:tcPr marL="9525" marR="9525" marT="9525" marB="0" anchor="ctr"/>
+                </a:tc>
+                <a:tc>
+                  <a:txBody>
+                    <a:bodyPr/>
+                    <a:lstStyle/>
+                    <a:p>
+                      <a:pPr algn="ctr" fontAlgn="ctr"/>
+                      <a:r>
+                        <a:rPr lang="en-US" sz="1100" b="0" i="0" u="none" strike="noStrike">
+                          <a:solidFill>
+                            <a:srgbClr val="000000"/>
+                          </a:solidFill>
+                          <a:effectLst/>
+                          <a:latin typeface="Arial" panose="020B0604020202020204" pitchFamily="34" charset="0"/>
+                        </a:rPr>
+                        <a:t>1</a:t>
+                      </a:r>
+                    </a:p>
+                  </a:txBody>
+                  <a:tcPr marL="9525" marR="9525" marT="9525" marB="0" anchor="ctr"/>
+                </a:tc>
+                <a:tc>
+                  <a:txBody>
+                    <a:bodyPr/>
+                    <a:lstStyle/>
+                    <a:p>
+                      <a:pPr algn="l" fontAlgn="ctr"/>
+                      <a:r>
+                        <a:rPr lang="en-US" sz="1100" b="0" i="0" u="none" strike="noStrike" dirty="0">
+                          <a:solidFill>
+                            <a:srgbClr val="000000"/>
+                          </a:solidFill>
+                          <a:effectLst/>
+                          <a:latin typeface="Arial" panose="020B0604020202020204" pitchFamily="34" charset="0"/>
+                        </a:rPr>
+                        <a:t>Device shall communicate with a mobile application</a:t>
+                      </a:r>
+                    </a:p>
+                  </a:txBody>
+                  <a:tcPr marL="9525" marR="9525" marT="9525" marB="0" anchor="ctr"/>
+                </a:tc>
+                <a:extLst>
+                  <a:ext uri="{0D108BD9-81ED-4DB2-BD59-A6C34878D82A}">
+                    <a16:rowId xmlns:a16="http://schemas.microsoft.com/office/drawing/2014/main" val="3064694566"/>
+                  </a:ext>
+                </a:extLst>
+              </a:tr>
+              <a:tr h="370840">
+                <a:tc>
+                  <a:txBody>
+                    <a:bodyPr/>
+                    <a:lstStyle/>
+                    <a:p>
+                      <a:pPr algn="ctr" fontAlgn="ctr"/>
+                      <a:r>
+                        <a:rPr lang="en-US" sz="1100" b="0" i="0" u="none" strike="noStrike" dirty="0">
+                          <a:solidFill>
+                            <a:srgbClr val="000000"/>
+                          </a:solidFill>
+                          <a:effectLst/>
+                          <a:latin typeface="Arial" panose="020B0604020202020204" pitchFamily="34" charset="0"/>
+                        </a:rPr>
+                        <a:t>5</a:t>
+                      </a:r>
+                    </a:p>
+                  </a:txBody>
+                  <a:tcPr marL="9525" marR="9525" marT="9525" marB="0" anchor="ctr"/>
+                </a:tc>
+                <a:tc>
+                  <a:txBody>
+                    <a:bodyPr/>
+                    <a:lstStyle/>
+                    <a:p>
+                      <a:pPr algn="ctr" fontAlgn="ctr"/>
+                      <a:r>
+                        <a:rPr lang="en-US" sz="1100" b="0" i="0" u="none" strike="noStrike">
+                          <a:solidFill>
+                            <a:srgbClr val="000000"/>
+                          </a:solidFill>
+                          <a:effectLst/>
+                          <a:latin typeface="Arial" panose="020B0604020202020204" pitchFamily="34" charset="0"/>
+                        </a:rPr>
+                        <a:t>4</a:t>
+                      </a:r>
+                    </a:p>
+                  </a:txBody>
+                  <a:tcPr marL="9525" marR="9525" marT="9525" marB="0" anchor="ctr"/>
+                </a:tc>
+                <a:tc>
+                  <a:txBody>
+                    <a:bodyPr/>
+                    <a:lstStyle/>
+                    <a:p>
+                      <a:pPr algn="l" fontAlgn="ctr"/>
+                      <a:r>
+                        <a:rPr lang="en-US" sz="1100" b="0" i="0" u="none" strike="noStrike" dirty="0">
+                          <a:solidFill>
+                            <a:srgbClr val="000000"/>
+                          </a:solidFill>
+                          <a:effectLst/>
+                          <a:latin typeface="Arial" panose="020B0604020202020204" pitchFamily="34" charset="0"/>
+                        </a:rPr>
+                        <a:t>Device shall contain an attached LED light that conforms to ANSI C82.16-2015 standard</a:t>
+                      </a:r>
+                    </a:p>
+                  </a:txBody>
+                  <a:tcPr marL="9525" marR="9525" marT="9525" marB="0" anchor="ctr"/>
+                </a:tc>
+                <a:extLst>
+                  <a:ext uri="{0D108BD9-81ED-4DB2-BD59-A6C34878D82A}">
+                    <a16:rowId xmlns:a16="http://schemas.microsoft.com/office/drawing/2014/main" val="319062043"/>
+                  </a:ext>
+                </a:extLst>
+              </a:tr>
+              <a:tr h="370840">
+                <a:tc>
+                  <a:txBody>
+                    <a:bodyPr/>
+                    <a:lstStyle/>
+                    <a:p>
+                      <a:pPr algn="ctr" fontAlgn="ctr"/>
+                      <a:r>
+                        <a:rPr lang="en-US" sz="1100" b="0" i="0" u="none" strike="noStrike" dirty="0">
+                          <a:solidFill>
+                            <a:srgbClr val="000000"/>
+                          </a:solidFill>
+                          <a:effectLst/>
+                          <a:latin typeface="Arial" panose="020B0604020202020204" pitchFamily="34" charset="0"/>
+                        </a:rPr>
+                        <a:t>7</a:t>
+                      </a:r>
+                    </a:p>
+                  </a:txBody>
+                  <a:tcPr marL="9525" marR="9525" marT="9525" marB="0" anchor="ctr"/>
+                </a:tc>
+                <a:tc>
+                  <a:txBody>
+                    <a:bodyPr/>
+                    <a:lstStyle/>
+                    <a:p>
+                      <a:pPr algn="ctr" fontAlgn="ctr"/>
+                      <a:r>
+                        <a:rPr lang="en-US" sz="1100" b="0" i="0" u="none" strike="noStrike">
+                          <a:solidFill>
+                            <a:srgbClr val="000000"/>
+                          </a:solidFill>
+                          <a:effectLst/>
+                          <a:latin typeface="Arial" panose="020B0604020202020204" pitchFamily="34" charset="0"/>
+                        </a:rPr>
+                        <a:t>3</a:t>
+                      </a:r>
+                    </a:p>
+                  </a:txBody>
+                  <a:tcPr marL="9525" marR="9525" marT="9525" marB="0" anchor="ctr"/>
+                </a:tc>
+                <a:tc>
+                  <a:txBody>
+                    <a:bodyPr/>
+                    <a:lstStyle/>
+                    <a:p>
+                      <a:pPr algn="l" fontAlgn="ctr"/>
+                      <a:r>
+                        <a:rPr lang="en-US" sz="1100" b="0" i="0" u="none" strike="noStrike" dirty="0">
+                          <a:solidFill>
+                            <a:srgbClr val="000000"/>
+                          </a:solidFill>
+                          <a:effectLst/>
+                          <a:latin typeface="Arial" panose="020B0604020202020204" pitchFamily="34" charset="0"/>
+                        </a:rPr>
+                        <a:t>Mobile application shall be usable on a mobile device running Android 4.4 or newer</a:t>
+                      </a:r>
+                    </a:p>
+                  </a:txBody>
+                  <a:tcPr marL="9525" marR="9525" marT="9525" marB="0" anchor="ctr"/>
+                </a:tc>
+                <a:extLst>
+                  <a:ext uri="{0D108BD9-81ED-4DB2-BD59-A6C34878D82A}">
+                    <a16:rowId xmlns:a16="http://schemas.microsoft.com/office/drawing/2014/main" val="444472378"/>
+                  </a:ext>
+                </a:extLst>
+              </a:tr>
+              <a:tr h="370840">
+                <a:tc>
+                  <a:txBody>
+                    <a:bodyPr/>
+                    <a:lstStyle/>
+                    <a:p>
+                      <a:pPr algn="ctr" fontAlgn="ctr"/>
+                      <a:r>
+                        <a:rPr lang="en-US" sz="1100" b="0" i="0" u="none" strike="noStrike" dirty="0">
+                          <a:solidFill>
+                            <a:srgbClr val="000000"/>
+                          </a:solidFill>
+                          <a:effectLst/>
+                          <a:latin typeface="Arial" panose="020B0604020202020204" pitchFamily="34" charset="0"/>
+                        </a:rPr>
+                        <a:t>10</a:t>
+                      </a:r>
+                    </a:p>
+                  </a:txBody>
+                  <a:tcPr marL="9525" marR="9525" marT="9525" marB="0" anchor="ctr"/>
+                </a:tc>
+                <a:tc>
+                  <a:txBody>
+                    <a:bodyPr/>
+                    <a:lstStyle/>
+                    <a:p>
+                      <a:pPr algn="ctr" fontAlgn="ctr"/>
+                      <a:r>
+                        <a:rPr lang="en-US" sz="1100" b="0" i="0" u="none" strike="noStrike">
+                          <a:solidFill>
+                            <a:srgbClr val="000000"/>
+                          </a:solidFill>
+                          <a:effectLst/>
+                          <a:latin typeface="Arial" panose="020B0604020202020204" pitchFamily="34" charset="0"/>
+                        </a:rPr>
+                        <a:t>3</a:t>
+                      </a:r>
+                    </a:p>
+                  </a:txBody>
+                  <a:tcPr marL="9525" marR="9525" marT="9525" marB="0" anchor="ctr"/>
+                </a:tc>
+                <a:tc>
+                  <a:txBody>
+                    <a:bodyPr/>
+                    <a:lstStyle/>
+                    <a:p>
+                      <a:pPr algn="l" fontAlgn="ctr"/>
+                      <a:r>
+                        <a:rPr lang="en-US" sz="1100" b="0" i="0" u="none" strike="noStrike" dirty="0">
+                          <a:solidFill>
+                            <a:srgbClr val="000000"/>
+                          </a:solidFill>
+                          <a:effectLst/>
+                          <a:latin typeface="Arial" panose="020B0604020202020204" pitchFamily="34" charset="0"/>
+                        </a:rPr>
+                        <a:t>Mobile application shall allow the user to configure an audible tone of at least 60dB for an input date and time</a:t>
+                      </a:r>
+                    </a:p>
+                  </a:txBody>
+                  <a:tcPr marL="9525" marR="9525" marT="9525" marB="0" anchor="ctr"/>
+                </a:tc>
+                <a:extLst>
+                  <a:ext uri="{0D108BD9-81ED-4DB2-BD59-A6C34878D82A}">
+                    <a16:rowId xmlns:a16="http://schemas.microsoft.com/office/drawing/2014/main" val="1524273525"/>
+                  </a:ext>
+                </a:extLst>
+              </a:tr>
+              <a:tr h="370840">
+                <a:tc>
+                  <a:txBody>
+                    <a:bodyPr/>
+                    <a:lstStyle/>
+                    <a:p>
+                      <a:pPr algn="ctr" fontAlgn="ctr"/>
+                      <a:r>
+                        <a:rPr lang="en-US" sz="1100" b="0" i="0" u="none" strike="noStrike" dirty="0">
+                          <a:solidFill>
+                            <a:srgbClr val="000000"/>
+                          </a:solidFill>
+                          <a:effectLst/>
+                          <a:latin typeface="Arial" panose="020B0604020202020204" pitchFamily="34" charset="0"/>
+                        </a:rPr>
+                        <a:t>14</a:t>
+                      </a:r>
+                    </a:p>
+                  </a:txBody>
+                  <a:tcPr marL="9525" marR="9525" marT="9525" marB="0" anchor="ctr"/>
+                </a:tc>
+                <a:tc>
+                  <a:txBody>
+                    <a:bodyPr/>
+                    <a:lstStyle/>
+                    <a:p>
+                      <a:pPr algn="ctr" fontAlgn="ctr"/>
+                      <a:r>
+                        <a:rPr lang="en-US" sz="1100" b="0" i="0" u="none" strike="noStrike">
+                          <a:solidFill>
+                            <a:srgbClr val="000000"/>
+                          </a:solidFill>
+                          <a:effectLst/>
+                          <a:latin typeface="Arial" panose="020B0604020202020204" pitchFamily="34" charset="0"/>
+                        </a:rPr>
+                        <a:t>3</a:t>
+                      </a:r>
+                    </a:p>
+                  </a:txBody>
+                  <a:tcPr marL="9525" marR="9525" marT="9525" marB="0" anchor="ctr"/>
+                </a:tc>
+                <a:tc>
+                  <a:txBody>
+                    <a:bodyPr/>
+                    <a:lstStyle/>
+                    <a:p>
+                      <a:pPr algn="l" fontAlgn="ctr"/>
+                      <a:r>
+                        <a:rPr lang="en-US" sz="1100" b="0" i="0" u="none" strike="noStrike" dirty="0">
+                          <a:solidFill>
+                            <a:srgbClr val="000000"/>
+                          </a:solidFill>
+                          <a:effectLst/>
+                          <a:latin typeface="Arial" panose="020B0604020202020204" pitchFamily="34" charset="0"/>
+                        </a:rPr>
+                        <a:t>Mobile application shall store user defined email</a:t>
+                      </a:r>
+                    </a:p>
+                  </a:txBody>
+                  <a:tcPr marL="9525" marR="9525" marT="9525" marB="0" anchor="ctr"/>
+                </a:tc>
+                <a:extLst>
+                  <a:ext uri="{0D108BD9-81ED-4DB2-BD59-A6C34878D82A}">
+                    <a16:rowId xmlns:a16="http://schemas.microsoft.com/office/drawing/2014/main" val="3948006930"/>
+                  </a:ext>
+                </a:extLst>
+              </a:tr>
+              <a:tr h="370840">
+                <a:tc>
+                  <a:txBody>
+                    <a:bodyPr/>
+                    <a:lstStyle/>
+                    <a:p>
+                      <a:pPr algn="ctr" fontAlgn="ctr"/>
+                      <a:r>
+                        <a:rPr lang="en-US" sz="1100" b="0" i="0" u="none" strike="noStrike" dirty="0">
+                          <a:solidFill>
+                            <a:srgbClr val="000000"/>
+                          </a:solidFill>
+                          <a:effectLst/>
+                          <a:latin typeface="Arial" panose="020B0604020202020204" pitchFamily="34" charset="0"/>
+                        </a:rPr>
+                        <a:t>16</a:t>
+                      </a:r>
+                    </a:p>
+                  </a:txBody>
+                  <a:tcPr marL="9525" marR="9525" marT="9525" marB="0" anchor="ctr"/>
+                </a:tc>
+                <a:tc>
+                  <a:txBody>
+                    <a:bodyPr/>
+                    <a:lstStyle/>
+                    <a:p>
+                      <a:pPr algn="ctr" fontAlgn="ctr"/>
+                      <a:r>
+                        <a:rPr lang="en-US" sz="1100" b="0" i="0" u="none" strike="noStrike">
+                          <a:solidFill>
+                            <a:srgbClr val="000000"/>
+                          </a:solidFill>
+                          <a:effectLst/>
+                          <a:latin typeface="Arial" panose="020B0604020202020204" pitchFamily="34" charset="0"/>
+                        </a:rPr>
+                        <a:t>5</a:t>
+                      </a:r>
+                    </a:p>
+                  </a:txBody>
+                  <a:tcPr marL="9525" marR="9525" marT="9525" marB="0" anchor="ctr"/>
+                </a:tc>
+                <a:tc>
+                  <a:txBody>
+                    <a:bodyPr/>
+                    <a:lstStyle/>
+                    <a:p>
+                      <a:pPr algn="l" fontAlgn="ctr"/>
+                      <a:r>
+                        <a:rPr lang="en-US" sz="1100" b="0" i="0" u="none" strike="noStrike">
+                          <a:solidFill>
+                            <a:srgbClr val="000000"/>
+                          </a:solidFill>
+                          <a:effectLst/>
+                          <a:latin typeface="Arial" panose="020B0604020202020204" pitchFamily="34" charset="0"/>
+                        </a:rPr>
+                        <a:t>Device shall provide the user access to the battery through a folding panel</a:t>
+                      </a:r>
+                    </a:p>
+                  </a:txBody>
+                  <a:tcPr marL="9525" marR="9525" marT="9525" marB="0" anchor="ctr"/>
+                </a:tc>
+                <a:extLst>
+                  <a:ext uri="{0D108BD9-81ED-4DB2-BD59-A6C34878D82A}">
+                    <a16:rowId xmlns:a16="http://schemas.microsoft.com/office/drawing/2014/main" val="3274820058"/>
+                  </a:ext>
+                </a:extLst>
+              </a:tr>
+              <a:tr h="370840">
+                <a:tc>
+                  <a:txBody>
+                    <a:bodyPr/>
+                    <a:lstStyle/>
+                    <a:p>
+                      <a:pPr algn="ctr" fontAlgn="ctr"/>
+                      <a:r>
+                        <a:rPr lang="en-US" sz="1100" b="0" i="0" u="none" strike="noStrike">
+                          <a:solidFill>
+                            <a:srgbClr val="000000"/>
+                          </a:solidFill>
+                          <a:effectLst/>
+                          <a:latin typeface="Arial" panose="020B0604020202020204" pitchFamily="34" charset="0"/>
+                        </a:rPr>
+                        <a:t>17</a:t>
+                      </a:r>
+                    </a:p>
+                  </a:txBody>
+                  <a:tcPr marL="9525" marR="9525" marT="9525" marB="0" anchor="ctr"/>
+                </a:tc>
+                <a:tc>
+                  <a:txBody>
+                    <a:bodyPr/>
+                    <a:lstStyle/>
+                    <a:p>
+                      <a:pPr algn="ctr" fontAlgn="ctr"/>
+                      <a:r>
+                        <a:rPr lang="en-US" sz="1100" b="0" i="0" u="none" strike="noStrike">
+                          <a:solidFill>
+                            <a:srgbClr val="000000"/>
+                          </a:solidFill>
+                          <a:effectLst/>
+                          <a:latin typeface="Arial" panose="020B0604020202020204" pitchFamily="34" charset="0"/>
+                        </a:rPr>
+                        <a:t>5</a:t>
+                      </a:r>
+                    </a:p>
+                  </a:txBody>
+                  <a:tcPr marL="9525" marR="9525" marT="9525" marB="0" anchor="ctr"/>
+                </a:tc>
+                <a:tc>
+                  <a:txBody>
+                    <a:bodyPr/>
+                    <a:lstStyle/>
+                    <a:p>
+                      <a:pPr algn="l" fontAlgn="ctr"/>
+                      <a:r>
+                        <a:rPr lang="en-US" sz="1100" b="0" i="0" u="none" strike="noStrike" dirty="0">
+                          <a:solidFill>
+                            <a:srgbClr val="000000"/>
+                          </a:solidFill>
+                          <a:effectLst/>
+                          <a:latin typeface="Arial" panose="020B0604020202020204" pitchFamily="34" charset="0"/>
+                        </a:rPr>
+                        <a:t>Device shall accept a replacement battery of the same form factor</a:t>
+                      </a:r>
+                    </a:p>
+                  </a:txBody>
+                  <a:tcPr marL="9525" marR="9525" marT="9525" marB="0" anchor="ctr"/>
+                </a:tc>
+                <a:extLst>
+                  <a:ext uri="{0D108BD9-81ED-4DB2-BD59-A6C34878D82A}">
+                    <a16:rowId xmlns:a16="http://schemas.microsoft.com/office/drawing/2014/main" val="4103557642"/>
+                  </a:ext>
+                </a:extLst>
+              </a:tr>
+              <a:tr h="370840">
+                <a:tc>
+                  <a:txBody>
+                    <a:bodyPr/>
+                    <a:lstStyle/>
+                    <a:p>
+                      <a:pPr algn="ctr" fontAlgn="ctr"/>
+                      <a:r>
+                        <a:rPr lang="en-US" sz="1100" b="0" i="0" u="none" strike="noStrike" dirty="0">
+                          <a:solidFill>
+                            <a:srgbClr val="000000"/>
+                          </a:solidFill>
+                          <a:effectLst/>
+                          <a:latin typeface="Arial" panose="020B0604020202020204" pitchFamily="34" charset="0"/>
+                        </a:rPr>
+                        <a:t>18</a:t>
+                      </a:r>
+                    </a:p>
+                  </a:txBody>
+                  <a:tcPr marL="9525" marR="9525" marT="9525" marB="0" anchor="ctr"/>
+                </a:tc>
+                <a:tc>
+                  <a:txBody>
+                    <a:bodyPr/>
+                    <a:lstStyle/>
+                    <a:p>
+                      <a:pPr algn="ctr" fontAlgn="ctr"/>
+                      <a:r>
+                        <a:rPr lang="en-US" sz="1100" b="0" i="0" u="none" strike="noStrike" dirty="0">
+                          <a:solidFill>
+                            <a:srgbClr val="000000"/>
+                          </a:solidFill>
+                          <a:effectLst/>
+                          <a:latin typeface="Arial" panose="020B0604020202020204" pitchFamily="34" charset="0"/>
+                        </a:rPr>
+                        <a:t>6</a:t>
+                      </a:r>
+                    </a:p>
+                  </a:txBody>
+                  <a:tcPr marL="9525" marR="9525" marT="9525" marB="0" anchor="ctr"/>
+                </a:tc>
+                <a:tc>
+                  <a:txBody>
+                    <a:bodyPr/>
+                    <a:lstStyle/>
+                    <a:p>
+                      <a:pPr algn="l" fontAlgn="ctr"/>
+                      <a:r>
+                        <a:rPr lang="en-US" sz="1100" b="0" i="0" u="none" strike="noStrike" dirty="0">
+                          <a:solidFill>
+                            <a:srgbClr val="000000"/>
+                          </a:solidFill>
+                          <a:effectLst/>
+                          <a:latin typeface="Arial" panose="020B0604020202020204" pitchFamily="34" charset="0"/>
+                        </a:rPr>
+                        <a:t>Device shall function in temperatures above 32</a:t>
+                      </a:r>
+                      <a:r>
+                        <a:rPr lang="en-US" sz="1100" b="0" i="0" u="none" strike="noStrike" baseline="-25000" dirty="0">
+                          <a:solidFill>
+                            <a:srgbClr val="000000"/>
+                          </a:solidFill>
+                          <a:effectLst/>
+                          <a:latin typeface="Arial" panose="020B0604020202020204" pitchFamily="34" charset="0"/>
+                        </a:rPr>
+                        <a:t>­­</a:t>
+                      </a:r>
+                      <a:r>
+                        <a:rPr lang="en-US" sz="1100" b="0" i="0" u="none" strike="noStrike" dirty="0">
+                          <a:solidFill>
+                            <a:srgbClr val="000000"/>
+                          </a:solidFill>
+                          <a:effectLst/>
+                          <a:latin typeface="Arial" panose="020B0604020202020204" pitchFamily="34" charset="0"/>
+                        </a:rPr>
+                        <a:t>­­</a:t>
+                      </a:r>
+                      <a:r>
+                        <a:rPr lang="en-US" sz="1100" b="0" i="0" u="none" strike="noStrike" baseline="30000" dirty="0">
+                          <a:solidFill>
+                            <a:srgbClr val="000000"/>
+                          </a:solidFill>
+                          <a:effectLst/>
+                          <a:latin typeface="Arial" panose="020B0604020202020204" pitchFamily="34" charset="0"/>
+                        </a:rPr>
+                        <a:t>0</a:t>
+                      </a:r>
+                      <a:r>
+                        <a:rPr lang="en-US" sz="1100" b="0" i="0" u="none" strike="noStrike" dirty="0">
+                          <a:solidFill>
+                            <a:srgbClr val="000000"/>
+                          </a:solidFill>
+                          <a:effectLst/>
+                          <a:latin typeface="Arial" panose="020B0604020202020204" pitchFamily="34" charset="0"/>
+                        </a:rPr>
+                        <a:t>F</a:t>
+                      </a:r>
+                    </a:p>
+                  </a:txBody>
+                  <a:tcPr marL="9525" marR="9525" marT="9525" marB="0" anchor="ctr"/>
+                </a:tc>
+                <a:extLst>
+                  <a:ext uri="{0D108BD9-81ED-4DB2-BD59-A6C34878D82A}">
+                    <a16:rowId xmlns:a16="http://schemas.microsoft.com/office/drawing/2014/main" val="3940426027"/>
+                  </a:ext>
+                </a:extLst>
+              </a:tr>
+              <a:tr h="370840">
+                <a:tc>
+                  <a:txBody>
+                    <a:bodyPr/>
+                    <a:lstStyle/>
+                    <a:p>
+                      <a:pPr algn="ctr" fontAlgn="ctr"/>
+                      <a:r>
+                        <a:rPr lang="en-US" sz="1100" b="0" i="0" u="none" strike="noStrike" dirty="0">
+                          <a:solidFill>
+                            <a:srgbClr val="000000"/>
+                          </a:solidFill>
+                          <a:effectLst/>
+                          <a:latin typeface="Arial" panose="020B0604020202020204" pitchFamily="34" charset="0"/>
+                        </a:rPr>
+                        <a:t>21</a:t>
+                      </a:r>
+                    </a:p>
+                  </a:txBody>
+                  <a:tcPr marL="9525" marR="9525" marT="9525" marB="0" anchor="ctr"/>
+                </a:tc>
+                <a:tc>
+                  <a:txBody>
+                    <a:bodyPr/>
+                    <a:lstStyle/>
+                    <a:p>
+                      <a:pPr algn="ctr" fontAlgn="ctr"/>
+                      <a:r>
+                        <a:rPr lang="en-US" sz="1100" b="0" i="0" u="none" strike="noStrike">
+                          <a:solidFill>
+                            <a:srgbClr val="000000"/>
+                          </a:solidFill>
+                          <a:effectLst/>
+                          <a:latin typeface="Arial" panose="020B0604020202020204" pitchFamily="34" charset="0"/>
+                        </a:rPr>
+                        <a:t>6</a:t>
+                      </a:r>
+                    </a:p>
+                  </a:txBody>
+                  <a:tcPr marL="9525" marR="9525" marT="9525" marB="0" anchor="ctr"/>
+                </a:tc>
+                <a:tc>
+                  <a:txBody>
+                    <a:bodyPr/>
+                    <a:lstStyle/>
+                    <a:p>
+                      <a:pPr algn="l" fontAlgn="ctr"/>
+                      <a:r>
+                        <a:rPr lang="en-US" sz="1100" b="0" i="0" u="none" strike="noStrike" dirty="0">
+                          <a:solidFill>
+                            <a:srgbClr val="000000"/>
+                          </a:solidFill>
+                          <a:effectLst/>
+                          <a:latin typeface="Arial" panose="020B0604020202020204" pitchFamily="34" charset="0"/>
+                        </a:rPr>
+                        <a:t>Device shall function following a 3 ft exposure to unaccelerated gravity</a:t>
+                      </a:r>
+                    </a:p>
+                  </a:txBody>
+                  <a:tcPr marL="9525" marR="9525" marT="9525" marB="0" anchor="ctr"/>
+                </a:tc>
+                <a:extLst>
+                  <a:ext uri="{0D108BD9-81ED-4DB2-BD59-A6C34878D82A}">
+                    <a16:rowId xmlns:a16="http://schemas.microsoft.com/office/drawing/2014/main" val="880838299"/>
+                  </a:ext>
+                </a:extLst>
+              </a:tr>
+            </a:tbl>
+          </a:graphicData>
+        </a:graphic>
+      </p:graphicFrame>
+      <p:sp>
+        <p:nvSpPr>
+          <p:cNvPr id="7" name="Text Placeholder 6">
+            <a:extLst>
+              <a:ext uri="{FF2B5EF4-FFF2-40B4-BE49-F238E27FC236}">
+                <a16:creationId xmlns:a16="http://schemas.microsoft.com/office/drawing/2014/main" id="{AD252D19-DFA6-4EAC-83FF-009D42941F0D}"/>
+              </a:ext>
+            </a:extLst>
+          </p:cNvPr>
+          <p:cNvSpPr>
+            <a:spLocks noGrp="1"/>
+          </p:cNvSpPr>
+          <p:nvPr>
+            <p:ph type="body" sz="quarter" idx="3"/>
+          </p:nvPr>
+        </p:nvSpPr>
+        <p:spPr>
+          <a:xfrm>
+            <a:off x="5088384" y="1093253"/>
+            <a:ext cx="4185618" cy="576262"/>
+          </a:xfrm>
+        </p:spPr>
+        <p:txBody>
+          <a:bodyPr/>
+          <a:lstStyle/>
+          <a:p>
+            <a:r>
+              <a:rPr lang="en-US" dirty="0"/>
+              <a:t>Failed Requirements</a:t>
+            </a:r>
+          </a:p>
+        </p:txBody>
+      </p:sp>
+      <p:graphicFrame>
+        <p:nvGraphicFramePr>
+          <p:cNvPr id="10" name="Content Placeholder 9">
+            <a:extLst>
+              <a:ext uri="{FF2B5EF4-FFF2-40B4-BE49-F238E27FC236}">
+                <a16:creationId xmlns:a16="http://schemas.microsoft.com/office/drawing/2014/main" id="{510A23FD-1AB1-450E-8B45-33E57E62D2A2}"/>
+              </a:ext>
+            </a:extLst>
+          </p:cNvPr>
+          <p:cNvGraphicFramePr>
+            <a:graphicFrameLocks noGrp="1"/>
+          </p:cNvGraphicFramePr>
+          <p:nvPr>
+            <p:ph sz="quarter" idx="4"/>
+            <p:extLst>
+              <p:ext uri="{D42A27DB-BD31-4B8C-83A1-F6EECF244321}">
+                <p14:modId xmlns:p14="http://schemas.microsoft.com/office/powerpoint/2010/main" val="1298203731"/>
+              </p:ext>
+            </p:extLst>
+          </p:nvPr>
+        </p:nvGraphicFramePr>
+        <p:xfrm>
+          <a:off x="5087766" y="1669515"/>
+          <a:ext cx="4800513" cy="5101885"/>
+        </p:xfrm>
+        <a:graphic>
+          <a:graphicData uri="http://schemas.openxmlformats.org/drawingml/2006/table">
+            <a:tbl>
+              <a:tblPr firstRow="1" bandRow="1">
+                <a:tableStyleId>{5C22544A-7EE6-4342-B048-85BDC9FD1C3A}</a:tableStyleId>
+              </a:tblPr>
+              <a:tblGrid>
+                <a:gridCol w="993413">
+                  <a:extLst>
+                    <a:ext uri="{9D8B030D-6E8A-4147-A177-3AD203B41FA5}">
+                      <a16:colId xmlns:a16="http://schemas.microsoft.com/office/drawing/2014/main" val="1428720258"/>
+                    </a:ext>
+                  </a:extLst>
+                </a:gridCol>
+                <a:gridCol w="1036383">
+                  <a:extLst>
+                    <a:ext uri="{9D8B030D-6E8A-4147-A177-3AD203B41FA5}">
+                      <a16:colId xmlns:a16="http://schemas.microsoft.com/office/drawing/2014/main" val="1028759974"/>
+                    </a:ext>
+                  </a:extLst>
+                </a:gridCol>
+                <a:gridCol w="2770717">
+                  <a:extLst>
+                    <a:ext uri="{9D8B030D-6E8A-4147-A177-3AD203B41FA5}">
+                      <a16:colId xmlns:a16="http://schemas.microsoft.com/office/drawing/2014/main" val="89978012"/>
+                    </a:ext>
+                  </a:extLst>
+                </a:gridCol>
+              </a:tblGrid>
+              <a:tr h="305822">
+                <a:tc>
+                  <a:txBody>
+                    <a:bodyPr/>
+                    <a:lstStyle/>
+                    <a:p>
+                      <a:pPr algn="ctr" fontAlgn="ctr"/>
+                      <a:r>
+                        <a:rPr lang="en-US" sz="1100" b="0" i="0" u="none" strike="noStrike" dirty="0">
+                          <a:solidFill>
+                            <a:srgbClr val="000000"/>
+                          </a:solidFill>
+                          <a:effectLst/>
+                          <a:latin typeface="Arial" panose="020B0604020202020204" pitchFamily="34" charset="0"/>
+                        </a:rPr>
+                        <a:t>Req No.</a:t>
+                      </a:r>
+                    </a:p>
+                  </a:txBody>
+                  <a:tcPr marL="9525" marR="9525" marT="9525" marB="0" anchor="ctr"/>
+                </a:tc>
+                <a:tc>
+                  <a:txBody>
+                    <a:bodyPr/>
+                    <a:lstStyle/>
+                    <a:p>
+                      <a:pPr algn="ctr" fontAlgn="ctr"/>
+                      <a:r>
+                        <a:rPr lang="en-US" sz="1100" b="0" i="0" u="none" strike="noStrike">
+                          <a:solidFill>
+                            <a:srgbClr val="000000"/>
+                          </a:solidFill>
+                          <a:effectLst/>
+                          <a:latin typeface="Arial" panose="020B0604020202020204" pitchFamily="34" charset="0"/>
+                        </a:rPr>
+                        <a:t>Obj No.</a:t>
+                      </a:r>
+                    </a:p>
+                  </a:txBody>
+                  <a:tcPr marL="9525" marR="9525" marT="9525" marB="0" anchor="ctr"/>
+                </a:tc>
+                <a:tc>
+                  <a:txBody>
+                    <a:bodyPr/>
+                    <a:lstStyle/>
+                    <a:p>
+                      <a:pPr algn="l" fontAlgn="ctr"/>
+                      <a:r>
+                        <a:rPr lang="en-US" sz="1100" b="0" i="0" u="none" strike="noStrike" dirty="0">
+                          <a:solidFill>
+                            <a:srgbClr val="000000"/>
+                          </a:solidFill>
+                          <a:effectLst/>
+                          <a:latin typeface="Arial" panose="020B0604020202020204" pitchFamily="34" charset="0"/>
+                        </a:rPr>
+                        <a:t>Requirement</a:t>
+                      </a:r>
+                    </a:p>
+                  </a:txBody>
+                  <a:tcPr marL="9525" marR="9525" marT="9525" marB="0" anchor="ctr"/>
+                </a:tc>
+                <a:extLst>
+                  <a:ext uri="{0D108BD9-81ED-4DB2-BD59-A6C34878D82A}">
+                    <a16:rowId xmlns:a16="http://schemas.microsoft.com/office/drawing/2014/main" val="864798536"/>
+                  </a:ext>
+                </a:extLst>
+              </a:tr>
+              <a:tr h="305822">
+                <a:tc>
+                  <a:txBody>
+                    <a:bodyPr/>
+                    <a:lstStyle/>
+                    <a:p>
+                      <a:pPr algn="ctr" fontAlgn="ctr"/>
+                      <a:r>
+                        <a:rPr lang="en-US" sz="1100" b="0" i="0" u="none" strike="noStrike" dirty="0">
+                          <a:solidFill>
+                            <a:srgbClr val="000000"/>
+                          </a:solidFill>
+                          <a:effectLst/>
+                          <a:latin typeface="Arial" panose="020B0604020202020204" pitchFamily="34" charset="0"/>
+                        </a:rPr>
+                        <a:t>2</a:t>
+                      </a:r>
+                    </a:p>
+                  </a:txBody>
+                  <a:tcPr marL="9525" marR="9525" marT="9525" marB="0" anchor="ctr"/>
+                </a:tc>
+                <a:tc>
+                  <a:txBody>
+                    <a:bodyPr/>
+                    <a:lstStyle/>
+                    <a:p>
+                      <a:pPr algn="ctr" fontAlgn="ctr"/>
+                      <a:r>
+                        <a:rPr lang="en-US" sz="1100" b="0" i="0" u="none" strike="noStrike">
+                          <a:solidFill>
+                            <a:srgbClr val="000000"/>
+                          </a:solidFill>
+                          <a:effectLst/>
+                          <a:latin typeface="Arial" panose="020B0604020202020204" pitchFamily="34" charset="0"/>
+                        </a:rPr>
+                        <a:t>1</a:t>
+                      </a:r>
+                    </a:p>
+                  </a:txBody>
+                  <a:tcPr marL="9525" marR="9525" marT="9525" marB="0" anchor="ctr"/>
+                </a:tc>
+                <a:tc>
+                  <a:txBody>
+                    <a:bodyPr/>
+                    <a:lstStyle/>
+                    <a:p>
+                      <a:pPr algn="l" fontAlgn="ctr"/>
+                      <a:r>
+                        <a:rPr lang="en-US" sz="1100" b="0" i="0" u="none" strike="noStrike" dirty="0">
+                          <a:solidFill>
+                            <a:srgbClr val="000000"/>
+                          </a:solidFill>
+                          <a:effectLst/>
+                          <a:latin typeface="Arial" panose="020B0604020202020204" pitchFamily="34" charset="0"/>
+                        </a:rPr>
+                        <a:t>Device shall use an open source positioning system over Wi-Fi</a:t>
+                      </a:r>
+                    </a:p>
+                  </a:txBody>
+                  <a:tcPr marL="9525" marR="9525" marT="9525" marB="0" anchor="ctr"/>
+                </a:tc>
+                <a:extLst>
+                  <a:ext uri="{0D108BD9-81ED-4DB2-BD59-A6C34878D82A}">
+                    <a16:rowId xmlns:a16="http://schemas.microsoft.com/office/drawing/2014/main" val="3879857250"/>
+                  </a:ext>
+                </a:extLst>
+              </a:tr>
+              <a:tr h="560848">
+                <a:tc>
+                  <a:txBody>
+                    <a:bodyPr/>
+                    <a:lstStyle/>
+                    <a:p>
+                      <a:pPr algn="ctr" fontAlgn="ctr"/>
+                      <a:r>
+                        <a:rPr lang="en-US" sz="1100" b="0" i="0" u="none" strike="noStrike" dirty="0">
+                          <a:solidFill>
+                            <a:srgbClr val="000000"/>
+                          </a:solidFill>
+                          <a:effectLst/>
+                          <a:latin typeface="Arial" panose="020B0604020202020204" pitchFamily="34" charset="0"/>
+                        </a:rPr>
+                        <a:t>4</a:t>
+                      </a:r>
+                    </a:p>
+                  </a:txBody>
+                  <a:tcPr marL="9525" marR="9525" marT="9525" marB="0" anchor="ctr"/>
+                </a:tc>
+                <a:tc>
+                  <a:txBody>
+                    <a:bodyPr/>
+                    <a:lstStyle/>
+                    <a:p>
+                      <a:pPr algn="ctr" fontAlgn="ctr"/>
+                      <a:r>
+                        <a:rPr lang="en-US" sz="1100" b="0" i="0" u="none" strike="noStrike">
+                          <a:solidFill>
+                            <a:srgbClr val="000000"/>
+                          </a:solidFill>
+                          <a:effectLst/>
+                          <a:latin typeface="Arial" panose="020B0604020202020204" pitchFamily="34" charset="0"/>
+                        </a:rPr>
+                        <a:t>2</a:t>
+                      </a:r>
+                    </a:p>
+                  </a:txBody>
+                  <a:tcPr marL="9525" marR="9525" marT="9525" marB="0" anchor="ctr"/>
+                </a:tc>
+                <a:tc>
+                  <a:txBody>
+                    <a:bodyPr/>
+                    <a:lstStyle/>
+                    <a:p>
+                      <a:pPr algn="l" fontAlgn="ctr"/>
+                      <a:r>
+                        <a:rPr lang="en-US" sz="1100" b="0" i="0" u="none" strike="noStrike" dirty="0">
+                          <a:solidFill>
+                            <a:srgbClr val="000000"/>
+                          </a:solidFill>
+                          <a:effectLst/>
+                          <a:latin typeface="Arial" panose="020B0604020202020204" pitchFamily="34" charset="0"/>
+                        </a:rPr>
+                        <a:t>Device shall adhere to surfaces that meet SPI standards A-3, B-1, B-2, B-3, C-1, C-2, C-3 for molded plastic with Velcro© pads</a:t>
+                      </a:r>
+                    </a:p>
+                  </a:txBody>
+                  <a:tcPr marL="9525" marR="9525" marT="9525" marB="0" anchor="ctr"/>
+                </a:tc>
+                <a:extLst>
+                  <a:ext uri="{0D108BD9-81ED-4DB2-BD59-A6C34878D82A}">
+                    <a16:rowId xmlns:a16="http://schemas.microsoft.com/office/drawing/2014/main" val="3796186704"/>
+                  </a:ext>
+                </a:extLst>
+              </a:tr>
+              <a:tr h="305822">
+                <a:tc>
+                  <a:txBody>
+                    <a:bodyPr/>
+                    <a:lstStyle/>
+                    <a:p>
+                      <a:pPr algn="ctr" fontAlgn="ctr"/>
+                      <a:r>
+                        <a:rPr lang="en-US" sz="1100" b="0" i="0" u="none" strike="noStrike" dirty="0">
+                          <a:solidFill>
+                            <a:srgbClr val="000000"/>
+                          </a:solidFill>
+                          <a:effectLst/>
+                          <a:latin typeface="Arial" panose="020B0604020202020204" pitchFamily="34" charset="0"/>
+                        </a:rPr>
+                        <a:t>6</a:t>
+                      </a:r>
+                    </a:p>
+                  </a:txBody>
+                  <a:tcPr marL="9525" marR="9525" marT="9525" marB="0" anchor="ctr"/>
+                </a:tc>
+                <a:tc>
+                  <a:txBody>
+                    <a:bodyPr/>
+                    <a:lstStyle/>
+                    <a:p>
+                      <a:pPr algn="ctr" fontAlgn="ctr"/>
+                      <a:r>
+                        <a:rPr lang="en-US" sz="1100" b="0" i="0" u="none" strike="noStrike">
+                          <a:solidFill>
+                            <a:srgbClr val="000000"/>
+                          </a:solidFill>
+                          <a:effectLst/>
+                          <a:latin typeface="Arial" panose="020B0604020202020204" pitchFamily="34" charset="0"/>
+                        </a:rPr>
+                        <a:t>1</a:t>
+                      </a:r>
+                    </a:p>
+                  </a:txBody>
+                  <a:tcPr marL="9525" marR="9525" marT="9525" marB="0" anchor="ctr"/>
+                </a:tc>
+                <a:tc>
+                  <a:txBody>
+                    <a:bodyPr/>
+                    <a:lstStyle/>
+                    <a:p>
+                      <a:pPr algn="l" fontAlgn="ctr"/>
+                      <a:r>
+                        <a:rPr lang="en-US" sz="1100" b="0" i="0" u="none" strike="noStrike" dirty="0">
+                          <a:solidFill>
+                            <a:srgbClr val="000000"/>
+                          </a:solidFill>
+                          <a:effectLst/>
+                          <a:latin typeface="Arial" panose="020B0604020202020204" pitchFamily="34" charset="0"/>
+                        </a:rPr>
+                        <a:t>Device shall include a mobile application</a:t>
+                      </a:r>
+                    </a:p>
+                  </a:txBody>
+                  <a:tcPr marL="9525" marR="9525" marT="9525" marB="0" anchor="ctr"/>
+                </a:tc>
+                <a:extLst>
+                  <a:ext uri="{0D108BD9-81ED-4DB2-BD59-A6C34878D82A}">
+                    <a16:rowId xmlns:a16="http://schemas.microsoft.com/office/drawing/2014/main" val="2198286599"/>
+                  </a:ext>
+                </a:extLst>
+              </a:tr>
+              <a:tr h="560848">
+                <a:tc>
+                  <a:txBody>
+                    <a:bodyPr/>
+                    <a:lstStyle/>
+                    <a:p>
+                      <a:pPr algn="ctr" fontAlgn="ctr"/>
+                      <a:r>
+                        <a:rPr lang="en-US" sz="1100" b="0" i="0" u="none" strike="noStrike" dirty="0">
+                          <a:solidFill>
+                            <a:srgbClr val="000000"/>
+                          </a:solidFill>
+                          <a:effectLst/>
+                          <a:latin typeface="Arial" panose="020B0604020202020204" pitchFamily="34" charset="0"/>
+                        </a:rPr>
+                        <a:t>8</a:t>
+                      </a:r>
+                    </a:p>
+                  </a:txBody>
+                  <a:tcPr marL="9525" marR="9525" marT="9525" marB="0" anchor="ctr"/>
+                </a:tc>
+                <a:tc>
+                  <a:txBody>
+                    <a:bodyPr/>
+                    <a:lstStyle/>
+                    <a:p>
+                      <a:pPr algn="ctr" fontAlgn="ctr"/>
+                      <a:r>
+                        <a:rPr lang="en-US" sz="1100" b="0" i="0" u="none" strike="noStrike">
+                          <a:solidFill>
+                            <a:srgbClr val="000000"/>
+                          </a:solidFill>
+                          <a:effectLst/>
+                          <a:latin typeface="Arial" panose="020B0604020202020204" pitchFamily="34" charset="0"/>
+                        </a:rPr>
+                        <a:t>3</a:t>
+                      </a:r>
+                    </a:p>
+                  </a:txBody>
+                  <a:tcPr marL="9525" marR="9525" marT="9525" marB="0" anchor="ctr"/>
+                </a:tc>
+                <a:tc>
+                  <a:txBody>
+                    <a:bodyPr/>
+                    <a:lstStyle/>
+                    <a:p>
+                      <a:pPr algn="l" fontAlgn="ctr"/>
+                      <a:r>
+                        <a:rPr lang="en-US" sz="1100" b="0" i="0" u="none" strike="noStrike">
+                          <a:solidFill>
+                            <a:srgbClr val="000000"/>
+                          </a:solidFill>
+                          <a:effectLst/>
+                          <a:latin typeface="Arial" panose="020B0604020202020204" pitchFamily="34" charset="0"/>
+                        </a:rPr>
+                        <a:t>Mobile application shall email the user provided email address when battery voltage drops below 80% of factory listed voltage</a:t>
+                      </a:r>
+                    </a:p>
+                  </a:txBody>
+                  <a:tcPr marL="9525" marR="9525" marT="9525" marB="0" anchor="ctr"/>
+                </a:tc>
+                <a:extLst>
+                  <a:ext uri="{0D108BD9-81ED-4DB2-BD59-A6C34878D82A}">
+                    <a16:rowId xmlns:a16="http://schemas.microsoft.com/office/drawing/2014/main" val="1068107053"/>
+                  </a:ext>
+                </a:extLst>
+              </a:tr>
+              <a:tr h="422599">
+                <a:tc>
+                  <a:txBody>
+                    <a:bodyPr/>
+                    <a:lstStyle/>
+                    <a:p>
+                      <a:pPr algn="ctr" fontAlgn="ctr"/>
+                      <a:r>
+                        <a:rPr lang="en-US" sz="1100" b="0" i="0" u="none" strike="noStrike">
+                          <a:solidFill>
+                            <a:srgbClr val="000000"/>
+                          </a:solidFill>
+                          <a:effectLst/>
+                          <a:latin typeface="Arial" panose="020B0604020202020204" pitchFamily="34" charset="0"/>
+                        </a:rPr>
+                        <a:t>9</a:t>
+                      </a:r>
+                    </a:p>
+                  </a:txBody>
+                  <a:tcPr marL="9525" marR="9525" marT="9525" marB="0" anchor="ctr"/>
+                </a:tc>
+                <a:tc>
+                  <a:txBody>
+                    <a:bodyPr/>
+                    <a:lstStyle/>
+                    <a:p>
+                      <a:pPr algn="ctr" fontAlgn="ctr"/>
+                      <a:r>
+                        <a:rPr lang="en-US" sz="1100" b="0" i="0" u="none" strike="noStrike">
+                          <a:solidFill>
+                            <a:srgbClr val="000000"/>
+                          </a:solidFill>
+                          <a:effectLst/>
+                          <a:latin typeface="Arial" panose="020B0604020202020204" pitchFamily="34" charset="0"/>
+                        </a:rPr>
+                        <a:t>3</a:t>
+                      </a:r>
+                    </a:p>
+                  </a:txBody>
+                  <a:tcPr marL="9525" marR="9525" marT="9525" marB="0" anchor="ctr"/>
+                </a:tc>
+                <a:tc>
+                  <a:txBody>
+                    <a:bodyPr/>
+                    <a:lstStyle/>
+                    <a:p>
+                      <a:pPr algn="l" fontAlgn="ctr"/>
+                      <a:r>
+                        <a:rPr lang="en-US" sz="1100" b="0" i="0" u="none" strike="noStrike" dirty="0">
+                          <a:solidFill>
+                            <a:srgbClr val="000000"/>
+                          </a:solidFill>
+                          <a:effectLst/>
+                          <a:latin typeface="Arial" panose="020B0604020202020204" pitchFamily="34" charset="0"/>
+                        </a:rPr>
+                        <a:t>Mobile application shall allow the user to configure a visual alarm for an input date and time</a:t>
+                      </a:r>
+                    </a:p>
+                  </a:txBody>
+                  <a:tcPr marL="9525" marR="9525" marT="9525" marB="0" anchor="ctr"/>
+                </a:tc>
+                <a:extLst>
+                  <a:ext uri="{0D108BD9-81ED-4DB2-BD59-A6C34878D82A}">
+                    <a16:rowId xmlns:a16="http://schemas.microsoft.com/office/drawing/2014/main" val="990199513"/>
+                  </a:ext>
+                </a:extLst>
+              </a:tr>
+              <a:tr h="422599">
+                <a:tc>
+                  <a:txBody>
+                    <a:bodyPr/>
+                    <a:lstStyle/>
+                    <a:p>
+                      <a:pPr algn="ctr" fontAlgn="ctr"/>
+                      <a:r>
+                        <a:rPr lang="en-US" sz="1100" b="0" i="0" u="none" strike="noStrike" dirty="0">
+                          <a:solidFill>
+                            <a:srgbClr val="000000"/>
+                          </a:solidFill>
+                          <a:effectLst/>
+                          <a:latin typeface="Arial" panose="020B0604020202020204" pitchFamily="34" charset="0"/>
+                        </a:rPr>
+                        <a:t>11</a:t>
+                      </a:r>
+                    </a:p>
+                  </a:txBody>
+                  <a:tcPr marL="9525" marR="9525" marT="9525" marB="0" anchor="ctr"/>
+                </a:tc>
+                <a:tc>
+                  <a:txBody>
+                    <a:bodyPr/>
+                    <a:lstStyle/>
+                    <a:p>
+                      <a:pPr algn="ctr" fontAlgn="ctr"/>
+                      <a:r>
+                        <a:rPr lang="en-US" sz="1100" b="0" i="0" u="none" strike="noStrike">
+                          <a:solidFill>
+                            <a:srgbClr val="000000"/>
+                          </a:solidFill>
+                          <a:effectLst/>
+                          <a:latin typeface="Arial" panose="020B0604020202020204" pitchFamily="34" charset="0"/>
+                        </a:rPr>
+                        <a:t>3</a:t>
+                      </a:r>
+                    </a:p>
+                  </a:txBody>
+                  <a:tcPr marL="9525" marR="9525" marT="9525" marB="0" anchor="ctr"/>
+                </a:tc>
+                <a:tc>
+                  <a:txBody>
+                    <a:bodyPr/>
+                    <a:lstStyle/>
+                    <a:p>
+                      <a:pPr algn="l" fontAlgn="ctr"/>
+                      <a:r>
+                        <a:rPr lang="en-US" sz="1100" b="0" i="0" u="none" strike="noStrike">
+                          <a:solidFill>
+                            <a:srgbClr val="000000"/>
+                          </a:solidFill>
+                          <a:effectLst/>
+                          <a:latin typeface="Arial" panose="020B0604020202020204" pitchFamily="34" charset="0"/>
+                        </a:rPr>
+                        <a:t>Mobile application shall allow the user to configure the LED light to turn on for an input date and time</a:t>
+                      </a:r>
+                    </a:p>
+                  </a:txBody>
+                  <a:tcPr marL="9525" marR="9525" marT="9525" marB="0" anchor="ctr"/>
+                </a:tc>
+                <a:extLst>
+                  <a:ext uri="{0D108BD9-81ED-4DB2-BD59-A6C34878D82A}">
+                    <a16:rowId xmlns:a16="http://schemas.microsoft.com/office/drawing/2014/main" val="201880371"/>
+                  </a:ext>
+                </a:extLst>
+              </a:tr>
+              <a:tr h="422599">
+                <a:tc>
+                  <a:txBody>
+                    <a:bodyPr/>
+                    <a:lstStyle/>
+                    <a:p>
+                      <a:pPr algn="ctr" fontAlgn="ctr"/>
+                      <a:r>
+                        <a:rPr lang="en-US" sz="1100" b="0" i="0" u="none" strike="noStrike">
+                          <a:solidFill>
+                            <a:srgbClr val="000000"/>
+                          </a:solidFill>
+                          <a:effectLst/>
+                          <a:latin typeface="Arial" panose="020B0604020202020204" pitchFamily="34" charset="0"/>
+                        </a:rPr>
+                        <a:t>12</a:t>
+                      </a:r>
+                    </a:p>
+                  </a:txBody>
+                  <a:tcPr marL="9525" marR="9525" marT="9525" marB="0" anchor="ctr"/>
+                </a:tc>
+                <a:tc>
+                  <a:txBody>
+                    <a:bodyPr/>
+                    <a:lstStyle/>
+                    <a:p>
+                      <a:pPr algn="ctr" fontAlgn="ctr"/>
+                      <a:r>
+                        <a:rPr lang="en-US" sz="1100" b="0" i="0" u="none" strike="noStrike">
+                          <a:solidFill>
+                            <a:srgbClr val="000000"/>
+                          </a:solidFill>
+                          <a:effectLst/>
+                          <a:latin typeface="Arial" panose="020B0604020202020204" pitchFamily="34" charset="0"/>
+                        </a:rPr>
+                        <a:t>3</a:t>
+                      </a:r>
+                    </a:p>
+                  </a:txBody>
+                  <a:tcPr marL="9525" marR="9525" marT="9525" marB="0" anchor="ctr"/>
+                </a:tc>
+                <a:tc>
+                  <a:txBody>
+                    <a:bodyPr/>
+                    <a:lstStyle/>
+                    <a:p>
+                      <a:pPr algn="l" fontAlgn="ctr"/>
+                      <a:r>
+                        <a:rPr lang="en-US" sz="1100" b="0" i="0" u="none" strike="noStrike">
+                          <a:solidFill>
+                            <a:srgbClr val="000000"/>
+                          </a:solidFill>
+                          <a:effectLst/>
+                          <a:latin typeface="Arial" panose="020B0604020202020204" pitchFamily="34" charset="0"/>
+                        </a:rPr>
+                        <a:t>Mobile application shall allow the user to see location information for the device</a:t>
+                      </a:r>
+                    </a:p>
+                  </a:txBody>
+                  <a:tcPr marL="9525" marR="9525" marT="9525" marB="0" anchor="ctr"/>
+                </a:tc>
+                <a:extLst>
+                  <a:ext uri="{0D108BD9-81ED-4DB2-BD59-A6C34878D82A}">
+                    <a16:rowId xmlns:a16="http://schemas.microsoft.com/office/drawing/2014/main" val="2445331682"/>
+                  </a:ext>
+                </a:extLst>
+              </a:tr>
+              <a:tr h="422599">
+                <a:tc>
+                  <a:txBody>
+                    <a:bodyPr/>
+                    <a:lstStyle/>
+                    <a:p>
+                      <a:pPr algn="ctr" fontAlgn="ctr"/>
+                      <a:r>
+                        <a:rPr lang="en-US" sz="1100" b="0" i="0" u="none" strike="noStrike">
+                          <a:solidFill>
+                            <a:srgbClr val="000000"/>
+                          </a:solidFill>
+                          <a:effectLst/>
+                          <a:latin typeface="Arial" panose="020B0604020202020204" pitchFamily="34" charset="0"/>
+                        </a:rPr>
+                        <a:t>13</a:t>
+                      </a:r>
+                    </a:p>
+                  </a:txBody>
+                  <a:tcPr marL="9525" marR="9525" marT="9525" marB="0" anchor="ctr"/>
+                </a:tc>
+                <a:tc>
+                  <a:txBody>
+                    <a:bodyPr/>
+                    <a:lstStyle/>
+                    <a:p>
+                      <a:pPr algn="ctr" fontAlgn="ctr"/>
+                      <a:r>
+                        <a:rPr lang="en-US" sz="1100" b="0" i="0" u="none" strike="noStrike">
+                          <a:solidFill>
+                            <a:srgbClr val="000000"/>
+                          </a:solidFill>
+                          <a:effectLst/>
+                          <a:latin typeface="Arial" panose="020B0604020202020204" pitchFamily="34" charset="0"/>
+                        </a:rPr>
+                        <a:t>3</a:t>
+                      </a:r>
+                    </a:p>
+                  </a:txBody>
+                  <a:tcPr marL="9525" marR="9525" marT="9525" marB="0" anchor="ctr"/>
+                </a:tc>
+                <a:tc>
+                  <a:txBody>
+                    <a:bodyPr/>
+                    <a:lstStyle/>
+                    <a:p>
+                      <a:pPr algn="l" fontAlgn="ctr"/>
+                      <a:r>
+                        <a:rPr lang="en-US" sz="1100" b="0" i="0" u="none" strike="noStrike" dirty="0">
+                          <a:solidFill>
+                            <a:srgbClr val="000000"/>
+                          </a:solidFill>
+                          <a:effectLst/>
+                          <a:latin typeface="Arial" panose="020B0604020202020204" pitchFamily="34" charset="0"/>
+                        </a:rPr>
+                        <a:t>Mobile application shall allow the user to define a custom name for the device</a:t>
+                      </a:r>
+                    </a:p>
+                  </a:txBody>
+                  <a:tcPr marL="9525" marR="9525" marT="9525" marB="0" anchor="ctr"/>
+                </a:tc>
+                <a:extLst>
+                  <a:ext uri="{0D108BD9-81ED-4DB2-BD59-A6C34878D82A}">
+                    <a16:rowId xmlns:a16="http://schemas.microsoft.com/office/drawing/2014/main" val="3871342288"/>
+                  </a:ext>
+                </a:extLst>
+              </a:tr>
+              <a:tr h="330494">
+                <a:tc>
+                  <a:txBody>
+                    <a:bodyPr/>
+                    <a:lstStyle/>
+                    <a:p>
+                      <a:pPr algn="ctr" fontAlgn="ctr"/>
+                      <a:r>
+                        <a:rPr lang="en-US" sz="1100" b="0" i="0" u="none" strike="noStrike" dirty="0">
+                          <a:solidFill>
+                            <a:srgbClr val="000000"/>
+                          </a:solidFill>
+                          <a:effectLst/>
+                          <a:latin typeface="Arial" panose="020B0604020202020204" pitchFamily="34" charset="0"/>
+                        </a:rPr>
+                        <a:t>15</a:t>
+                      </a:r>
+                    </a:p>
+                  </a:txBody>
+                  <a:tcPr marL="9525" marR="9525" marT="9525" marB="0" anchor="ctr"/>
+                </a:tc>
+                <a:tc>
+                  <a:txBody>
+                    <a:bodyPr/>
+                    <a:lstStyle/>
+                    <a:p>
+                      <a:pPr algn="ctr" fontAlgn="ctr"/>
+                      <a:r>
+                        <a:rPr lang="en-US" sz="1100" b="0" i="0" u="none" strike="noStrike">
+                          <a:solidFill>
+                            <a:srgbClr val="000000"/>
+                          </a:solidFill>
+                          <a:effectLst/>
+                          <a:latin typeface="Arial" panose="020B0604020202020204" pitchFamily="34" charset="0"/>
+                        </a:rPr>
+                        <a:t>3</a:t>
+                      </a:r>
+                    </a:p>
+                  </a:txBody>
+                  <a:tcPr marL="9525" marR="9525" marT="9525" marB="0" anchor="ctr"/>
+                </a:tc>
+                <a:tc>
+                  <a:txBody>
+                    <a:bodyPr/>
+                    <a:lstStyle/>
+                    <a:p>
+                      <a:pPr algn="l" fontAlgn="ctr"/>
+                      <a:r>
+                        <a:rPr lang="en-US" sz="1100" b="0" i="0" u="none" strike="noStrike" dirty="0">
+                          <a:solidFill>
+                            <a:srgbClr val="000000"/>
+                          </a:solidFill>
+                          <a:effectLst/>
+                          <a:latin typeface="Arial" panose="020B0604020202020204" pitchFamily="34" charset="0"/>
+                        </a:rPr>
+                        <a:t>Mobile application shall store user defined wi-fi network credentials</a:t>
+                      </a:r>
+                    </a:p>
+                  </a:txBody>
+                  <a:tcPr marL="9525" marR="9525" marT="9525" marB="0" anchor="ctr"/>
+                </a:tc>
+                <a:extLst>
+                  <a:ext uri="{0D108BD9-81ED-4DB2-BD59-A6C34878D82A}">
+                    <a16:rowId xmlns:a16="http://schemas.microsoft.com/office/drawing/2014/main" val="183775087"/>
+                  </a:ext>
+                </a:extLst>
+              </a:tr>
+              <a:tr h="305822">
+                <a:tc>
+                  <a:txBody>
+                    <a:bodyPr/>
+                    <a:lstStyle/>
+                    <a:p>
+                      <a:pPr algn="ctr" fontAlgn="ctr"/>
+                      <a:r>
+                        <a:rPr lang="en-US" sz="1100" b="0" i="0" u="none" strike="noStrike" dirty="0">
+                          <a:solidFill>
+                            <a:srgbClr val="000000"/>
+                          </a:solidFill>
+                          <a:effectLst/>
+                          <a:latin typeface="Arial" panose="020B0604020202020204" pitchFamily="34" charset="0"/>
+                        </a:rPr>
+                        <a:t>19</a:t>
+                      </a:r>
+                    </a:p>
+                  </a:txBody>
+                  <a:tcPr marL="9525" marR="9525" marT="9525" marB="0" anchor="ctr"/>
+                </a:tc>
+                <a:tc>
+                  <a:txBody>
+                    <a:bodyPr/>
+                    <a:lstStyle/>
+                    <a:p>
+                      <a:pPr algn="ctr" fontAlgn="ctr"/>
+                      <a:r>
+                        <a:rPr lang="en-US" sz="1100" b="0" i="0" u="none" strike="noStrike">
+                          <a:solidFill>
+                            <a:srgbClr val="000000"/>
+                          </a:solidFill>
+                          <a:effectLst/>
+                          <a:latin typeface="Arial" panose="020B0604020202020204" pitchFamily="34" charset="0"/>
+                        </a:rPr>
+                        <a:t>6</a:t>
+                      </a:r>
+                    </a:p>
+                  </a:txBody>
+                  <a:tcPr marL="9525" marR="9525" marT="9525" marB="0" anchor="ctr"/>
+                </a:tc>
+                <a:tc>
+                  <a:txBody>
+                    <a:bodyPr/>
+                    <a:lstStyle/>
+                    <a:p>
+                      <a:pPr algn="l" fontAlgn="ctr"/>
+                      <a:r>
+                        <a:rPr lang="en-US" sz="1100" b="0" i="0" u="none" strike="noStrike">
+                          <a:solidFill>
+                            <a:srgbClr val="000000"/>
+                          </a:solidFill>
+                          <a:effectLst/>
+                          <a:latin typeface="Arial" panose="020B0604020202020204" pitchFamily="34" charset="0"/>
+                        </a:rPr>
+                        <a:t>Device shall function in temperatures not exceeding 150</a:t>
+                      </a:r>
+                      <a:r>
+                        <a:rPr lang="en-US" sz="1100" b="0" i="0" u="none" strike="noStrike" baseline="30000">
+                          <a:solidFill>
+                            <a:srgbClr val="000000"/>
+                          </a:solidFill>
+                          <a:effectLst/>
+                          <a:latin typeface="Arial" panose="020B0604020202020204" pitchFamily="34" charset="0"/>
+                        </a:rPr>
+                        <a:t>0</a:t>
+                      </a:r>
+                      <a:r>
+                        <a:rPr lang="en-US" sz="1100" b="0" i="0" u="none" strike="noStrike">
+                          <a:solidFill>
+                            <a:srgbClr val="000000"/>
+                          </a:solidFill>
+                          <a:effectLst/>
+                          <a:latin typeface="Arial" panose="020B0604020202020204" pitchFamily="34" charset="0"/>
+                        </a:rPr>
+                        <a:t>F</a:t>
+                      </a:r>
+                    </a:p>
+                  </a:txBody>
+                  <a:tcPr marL="9525" marR="9525" marT="9525" marB="0" anchor="ctr"/>
+                </a:tc>
+                <a:extLst>
+                  <a:ext uri="{0D108BD9-81ED-4DB2-BD59-A6C34878D82A}">
+                    <a16:rowId xmlns:a16="http://schemas.microsoft.com/office/drawing/2014/main" val="2713232167"/>
+                  </a:ext>
+                </a:extLst>
+              </a:tr>
+              <a:tr h="305822">
+                <a:tc>
+                  <a:txBody>
+                    <a:bodyPr/>
+                    <a:lstStyle/>
+                    <a:p>
+                      <a:pPr algn="ctr" fontAlgn="ctr"/>
+                      <a:r>
+                        <a:rPr lang="en-US" sz="1100" b="0" i="0" u="none" strike="noStrike">
+                          <a:solidFill>
+                            <a:srgbClr val="000000"/>
+                          </a:solidFill>
+                          <a:effectLst/>
+                          <a:latin typeface="Arial" panose="020B0604020202020204" pitchFamily="34" charset="0"/>
+                        </a:rPr>
+                        <a:t>20</a:t>
+                      </a:r>
+                    </a:p>
+                  </a:txBody>
+                  <a:tcPr marL="9525" marR="9525" marT="9525" marB="0" anchor="ctr"/>
+                </a:tc>
+                <a:tc>
+                  <a:txBody>
+                    <a:bodyPr/>
+                    <a:lstStyle/>
+                    <a:p>
+                      <a:pPr algn="ctr" fontAlgn="ctr"/>
+                      <a:r>
+                        <a:rPr lang="en-US" sz="1100" b="0" i="0" u="none" strike="noStrike">
+                          <a:solidFill>
+                            <a:srgbClr val="000000"/>
+                          </a:solidFill>
+                          <a:effectLst/>
+                          <a:latin typeface="Arial" panose="020B0604020202020204" pitchFamily="34" charset="0"/>
+                        </a:rPr>
+                        <a:t>6</a:t>
+                      </a:r>
+                    </a:p>
+                  </a:txBody>
+                  <a:tcPr marL="9525" marR="9525" marT="9525" marB="0" anchor="ctr"/>
+                </a:tc>
+                <a:tc>
+                  <a:txBody>
+                    <a:bodyPr/>
+                    <a:lstStyle/>
+                    <a:p>
+                      <a:pPr algn="l" fontAlgn="ctr"/>
+                      <a:r>
+                        <a:rPr lang="en-US" sz="1100" b="0" i="0" u="none" strike="noStrike" dirty="0">
+                          <a:solidFill>
+                            <a:srgbClr val="000000"/>
+                          </a:solidFill>
+                          <a:effectLst/>
+                          <a:latin typeface="Arial" panose="020B0604020202020204" pitchFamily="34" charset="0"/>
+                        </a:rPr>
+                        <a:t>Device shall function if exposed to 8 </a:t>
+                      </a:r>
+                      <a:r>
+                        <a:rPr lang="en-US" sz="1100" b="0" i="0" u="none" strike="noStrike" dirty="0" err="1">
+                          <a:solidFill>
+                            <a:srgbClr val="000000"/>
+                          </a:solidFill>
+                          <a:effectLst/>
+                          <a:latin typeface="Arial" panose="020B0604020202020204" pitchFamily="34" charset="0"/>
+                        </a:rPr>
+                        <a:t>fl</a:t>
+                      </a:r>
+                      <a:r>
+                        <a:rPr lang="en-US" sz="1100" b="0" i="0" u="none" strike="noStrike" dirty="0">
+                          <a:solidFill>
+                            <a:srgbClr val="000000"/>
+                          </a:solidFill>
+                          <a:effectLst/>
+                          <a:latin typeface="Arial" panose="020B0604020202020204" pitchFamily="34" charset="0"/>
+                        </a:rPr>
+                        <a:t> oz of water</a:t>
+                      </a:r>
+                    </a:p>
+                  </a:txBody>
+                  <a:tcPr marL="9525" marR="9525" marT="9525" marB="0" anchor="ctr"/>
+                </a:tc>
+                <a:extLst>
+                  <a:ext uri="{0D108BD9-81ED-4DB2-BD59-A6C34878D82A}">
+                    <a16:rowId xmlns:a16="http://schemas.microsoft.com/office/drawing/2014/main" val="4029887565"/>
+                  </a:ext>
+                </a:extLst>
+              </a:tr>
+            </a:tbl>
+          </a:graphicData>
+        </a:graphic>
+      </p:graphicFrame>
     </p:spTree>
     <p:extLst>
       <p:ext uri="{BB962C8B-B14F-4D97-AF65-F5344CB8AC3E}">

</xml_diff>